<commit_message>
Edit post cdi schematic and treatment ot legend
</commit_message>
<xml_diff>
--- a/results/figures/post_CDI_PEG_exp_schematic.pptx
+++ b/results/figures/post_CDI_PEG_exp_schematic.pptx
@@ -2,7 +2,7 @@
 <file path=ppt/presentation.xml><?xml version="1.0" encoding="utf-8"?>
 <p:presentation xmlns:a="http://schemas.openxmlformats.org/drawingml/2006/main" xmlns:r="http://schemas.openxmlformats.org/officeDocument/2006/relationships" xmlns:p="http://schemas.openxmlformats.org/presentationml/2006/main" saveSubsetFonts="1">
   <p:sldMasterIdLst>
-    <p:sldMasterId id="2147483720" r:id="rId1"/>
+    <p:sldMasterId id="2147483792" r:id="rId1"/>
   </p:sldMasterIdLst>
   <p:notesMasterIdLst>
     <p:notesMasterId r:id="rId3"/>
@@ -10,7 +10,7 @@
   <p:sldIdLst>
     <p:sldId id="533" r:id="rId2"/>
   </p:sldIdLst>
-  <p:sldSz cx="7315200" cy="3657600"/>
+  <p:sldSz cx="6610350" cy="3108325"/>
   <p:notesSz cx="6858000" cy="9144000"/>
   <p:defaultTextStyle>
     <a:defPPr>
@@ -107,6 +107,11 @@
       </a:defRPr>
     </a:lvl9pPr>
   </p:defaultTextStyle>
+  <p:extLst>
+    <p:ext uri="{EFAFB233-063F-42B5-8137-9DF3F51BA10A}">
+      <p15:sldGuideLst xmlns:p15="http://schemas.microsoft.com/office/powerpoint/2012/main"/>
+    </p:ext>
+  </p:extLst>
 </p:presentation>
 </file>
 
@@ -192,7 +197,7 @@
           <a:p>
             <a:fld id="{A2B1C1CA-69EF-464D-AE40-C4D6E113BFD1}" type="datetimeFigureOut">
               <a:rPr lang="en-US" smtClean="0"/>
-              <a:t>2/19/2021</a:t>
+              <a:t>2/23/2021</a:t>
             </a:fld>
             <a:endParaRPr lang="en-US"/>
           </a:p>
@@ -210,8 +215,8 @@
         </p:nvSpPr>
         <p:spPr>
           <a:xfrm>
-            <a:off x="342900" y="1143000"/>
-            <a:ext cx="6172200" cy="3086100"/>
+            <a:off x="147638" y="1143000"/>
+            <a:ext cx="6562725" cy="3086100"/>
           </a:xfrm>
           <a:prstGeom prst="rect">
             <a:avLst/>
@@ -365,8 +370,8 @@
   </p:cSld>
   <p:clrMap bg1="lt1" tx1="dk1" bg2="lt2" tx2="dk2" accent1="accent1" accent2="accent2" accent3="accent3" accent4="accent4" accent5="accent5" accent6="accent6" hlink="hlink" folHlink="folHlink"/>
   <p:notesStyle>
-    <a:lvl1pPr marL="0" algn="l" defTabSz="485253" rtl="0" eaLnBrk="1" latinLnBrk="0" hangingPunct="1">
-      <a:defRPr sz="637" kern="1200">
+    <a:lvl1pPr marL="0" algn="l" defTabSz="428447" rtl="0" eaLnBrk="1" latinLnBrk="0" hangingPunct="1">
+      <a:defRPr sz="563" kern="1200">
         <a:solidFill>
           <a:schemeClr val="tx1"/>
         </a:solidFill>
@@ -375,8 +380,8 @@
         <a:cs typeface="+mn-cs"/>
       </a:defRPr>
     </a:lvl1pPr>
-    <a:lvl2pPr marL="242626" algn="l" defTabSz="485253" rtl="0" eaLnBrk="1" latinLnBrk="0" hangingPunct="1">
-      <a:defRPr sz="637" kern="1200">
+    <a:lvl2pPr marL="214223" algn="l" defTabSz="428447" rtl="0" eaLnBrk="1" latinLnBrk="0" hangingPunct="1">
+      <a:defRPr sz="563" kern="1200">
         <a:solidFill>
           <a:schemeClr val="tx1"/>
         </a:solidFill>
@@ -385,8 +390,8 @@
         <a:cs typeface="+mn-cs"/>
       </a:defRPr>
     </a:lvl2pPr>
-    <a:lvl3pPr marL="485253" algn="l" defTabSz="485253" rtl="0" eaLnBrk="1" latinLnBrk="0" hangingPunct="1">
-      <a:defRPr sz="637" kern="1200">
+    <a:lvl3pPr marL="428447" algn="l" defTabSz="428447" rtl="0" eaLnBrk="1" latinLnBrk="0" hangingPunct="1">
+      <a:defRPr sz="563" kern="1200">
         <a:solidFill>
           <a:schemeClr val="tx1"/>
         </a:solidFill>
@@ -395,8 +400,8 @@
         <a:cs typeface="+mn-cs"/>
       </a:defRPr>
     </a:lvl3pPr>
-    <a:lvl4pPr marL="727879" algn="l" defTabSz="485253" rtl="0" eaLnBrk="1" latinLnBrk="0" hangingPunct="1">
-      <a:defRPr sz="637" kern="1200">
+    <a:lvl4pPr marL="642670" algn="l" defTabSz="428447" rtl="0" eaLnBrk="1" latinLnBrk="0" hangingPunct="1">
+      <a:defRPr sz="563" kern="1200">
         <a:solidFill>
           <a:schemeClr val="tx1"/>
         </a:solidFill>
@@ -405,8 +410,8 @@
         <a:cs typeface="+mn-cs"/>
       </a:defRPr>
     </a:lvl4pPr>
-    <a:lvl5pPr marL="970505" algn="l" defTabSz="485253" rtl="0" eaLnBrk="1" latinLnBrk="0" hangingPunct="1">
-      <a:defRPr sz="637" kern="1200">
+    <a:lvl5pPr marL="856893" algn="l" defTabSz="428447" rtl="0" eaLnBrk="1" latinLnBrk="0" hangingPunct="1">
+      <a:defRPr sz="563" kern="1200">
         <a:solidFill>
           <a:schemeClr val="tx1"/>
         </a:solidFill>
@@ -415,8 +420,8 @@
         <a:cs typeface="+mn-cs"/>
       </a:defRPr>
     </a:lvl5pPr>
-    <a:lvl6pPr marL="1213132" algn="l" defTabSz="485253" rtl="0" eaLnBrk="1" latinLnBrk="0" hangingPunct="1">
-      <a:defRPr sz="637" kern="1200">
+    <a:lvl6pPr marL="1071117" algn="l" defTabSz="428447" rtl="0" eaLnBrk="1" latinLnBrk="0" hangingPunct="1">
+      <a:defRPr sz="563" kern="1200">
         <a:solidFill>
           <a:schemeClr val="tx1"/>
         </a:solidFill>
@@ -425,8 +430,8 @@
         <a:cs typeface="+mn-cs"/>
       </a:defRPr>
     </a:lvl6pPr>
-    <a:lvl7pPr marL="1455757" algn="l" defTabSz="485253" rtl="0" eaLnBrk="1" latinLnBrk="0" hangingPunct="1">
-      <a:defRPr sz="637" kern="1200">
+    <a:lvl7pPr marL="1285339" algn="l" defTabSz="428447" rtl="0" eaLnBrk="1" latinLnBrk="0" hangingPunct="1">
+      <a:defRPr sz="563" kern="1200">
         <a:solidFill>
           <a:schemeClr val="tx1"/>
         </a:solidFill>
@@ -435,8 +440,8 @@
         <a:cs typeface="+mn-cs"/>
       </a:defRPr>
     </a:lvl7pPr>
-    <a:lvl8pPr marL="1698385" algn="l" defTabSz="485253" rtl="0" eaLnBrk="1" latinLnBrk="0" hangingPunct="1">
-      <a:defRPr sz="637" kern="1200">
+    <a:lvl8pPr marL="1499563" algn="l" defTabSz="428447" rtl="0" eaLnBrk="1" latinLnBrk="0" hangingPunct="1">
+      <a:defRPr sz="563" kern="1200">
         <a:solidFill>
           <a:schemeClr val="tx1"/>
         </a:solidFill>
@@ -445,8 +450,8 @@
         <a:cs typeface="+mn-cs"/>
       </a:defRPr>
     </a:lvl8pPr>
-    <a:lvl9pPr marL="1941010" algn="l" defTabSz="485253" rtl="0" eaLnBrk="1" latinLnBrk="0" hangingPunct="1">
-      <a:defRPr sz="637" kern="1200">
+    <a:lvl9pPr marL="1713785" algn="l" defTabSz="428447" rtl="0" eaLnBrk="1" latinLnBrk="0" hangingPunct="1">
+      <a:defRPr sz="563" kern="1200">
         <a:solidFill>
           <a:schemeClr val="tx1"/>
         </a:solidFill>
@@ -488,8 +493,8 @@
         </p:nvSpPr>
         <p:spPr>
           <a:xfrm>
-            <a:off x="342900" y="1143000"/>
-            <a:ext cx="6172200" cy="3086100"/>
+            <a:off x="147638" y="1143000"/>
+            <a:ext cx="6562725" cy="3086100"/>
           </a:xfrm>
           <a:custGeom>
             <a:avLst/>
@@ -797,15 +802,15 @@
         </p:nvSpPr>
         <p:spPr>
           <a:xfrm>
-            <a:off x="914400" y="598593"/>
-            <a:ext cx="5486400" cy="1273387"/>
+            <a:off x="826294" y="508700"/>
+            <a:ext cx="4957763" cy="1082158"/>
           </a:xfrm>
         </p:spPr>
         <p:txBody>
           <a:bodyPr anchor="b"/>
           <a:lstStyle>
             <a:lvl1pPr algn="ctr">
-              <a:defRPr sz="3200"/>
+              <a:defRPr sz="2719"/>
             </a:lvl1pPr>
           </a:lstStyle>
           <a:p>
@@ -829,8 +834,8 @@
         </p:nvSpPr>
         <p:spPr>
           <a:xfrm>
-            <a:off x="914400" y="1921087"/>
-            <a:ext cx="5486400" cy="883073"/>
+            <a:off x="826294" y="1632590"/>
+            <a:ext cx="4957763" cy="750459"/>
           </a:xfrm>
         </p:spPr>
         <p:txBody>
@@ -838,39 +843,39 @@
           <a:lstStyle>
             <a:lvl1pPr marL="0" indent="0" algn="ctr">
               <a:buNone/>
-              <a:defRPr sz="1280"/>
+              <a:defRPr sz="1088"/>
             </a:lvl1pPr>
-            <a:lvl2pPr marL="243825" indent="0" algn="ctr">
-              <a:buNone/>
-              <a:defRPr sz="1067"/>
+            <a:lvl2pPr marL="207203" indent="0" algn="ctr">
+              <a:buNone/>
+              <a:defRPr sz="906"/>
             </a:lvl2pPr>
-            <a:lvl3pPr marL="487650" indent="0" algn="ctr">
-              <a:buNone/>
-              <a:defRPr sz="960"/>
+            <a:lvl3pPr marL="414406" indent="0" algn="ctr">
+              <a:buNone/>
+              <a:defRPr sz="816"/>
             </a:lvl3pPr>
-            <a:lvl4pPr marL="731474" indent="0" algn="ctr">
-              <a:buNone/>
-              <a:defRPr sz="853"/>
+            <a:lvl4pPr marL="621609" indent="0" algn="ctr">
+              <a:buNone/>
+              <a:defRPr sz="725"/>
             </a:lvl4pPr>
-            <a:lvl5pPr marL="975299" indent="0" algn="ctr">
-              <a:buNone/>
-              <a:defRPr sz="853"/>
+            <a:lvl5pPr marL="828812" indent="0" algn="ctr">
+              <a:buNone/>
+              <a:defRPr sz="725"/>
             </a:lvl5pPr>
-            <a:lvl6pPr marL="1219124" indent="0" algn="ctr">
-              <a:buNone/>
-              <a:defRPr sz="853"/>
+            <a:lvl6pPr marL="1036015" indent="0" algn="ctr">
+              <a:buNone/>
+              <a:defRPr sz="725"/>
             </a:lvl6pPr>
-            <a:lvl7pPr marL="1462949" indent="0" algn="ctr">
-              <a:buNone/>
-              <a:defRPr sz="853"/>
+            <a:lvl7pPr marL="1243218" indent="0" algn="ctr">
+              <a:buNone/>
+              <a:defRPr sz="725"/>
             </a:lvl7pPr>
-            <a:lvl8pPr marL="1706773" indent="0" algn="ctr">
-              <a:buNone/>
-              <a:defRPr sz="853"/>
+            <a:lvl8pPr marL="1450421" indent="0" algn="ctr">
+              <a:buNone/>
+              <a:defRPr sz="725"/>
             </a:lvl8pPr>
-            <a:lvl9pPr marL="1950598" indent="0" algn="ctr">
-              <a:buNone/>
-              <a:defRPr sz="853"/>
+            <a:lvl9pPr marL="1657624" indent="0" algn="ctr">
+              <a:buNone/>
+              <a:defRPr sz="725"/>
             </a:lvl9pPr>
           </a:lstStyle>
           <a:p>
@@ -899,7 +904,7 @@
           <a:p>
             <a:fld id="{9FF62ED1-3F4C-4576-9568-E8EF953AA21A}" type="datetimeFigureOut">
               <a:rPr lang="en-US" smtClean="0"/>
-              <a:t>2/19/2021</a:t>
+              <a:t>2/23/2021</a:t>
             </a:fld>
             <a:endParaRPr lang="en-US"/>
           </a:p>
@@ -950,7 +955,7 @@
     </p:spTree>
     <p:extLst>
       <p:ext uri="{BB962C8B-B14F-4D97-AF65-F5344CB8AC3E}">
-        <p14:creationId xmlns:p14="http://schemas.microsoft.com/office/powerpoint/2010/main" val="1310328292"/>
+        <p14:creationId xmlns:p14="http://schemas.microsoft.com/office/powerpoint/2010/main" val="3615869639"/>
       </p:ext>
     </p:extLst>
   </p:cSld>
@@ -1069,7 +1074,7 @@
           <a:p>
             <a:fld id="{9FF62ED1-3F4C-4576-9568-E8EF953AA21A}" type="datetimeFigureOut">
               <a:rPr lang="en-US" smtClean="0"/>
-              <a:t>2/19/2021</a:t>
+              <a:t>2/23/2021</a:t>
             </a:fld>
             <a:endParaRPr lang="en-US"/>
           </a:p>
@@ -1120,7 +1125,7 @@
     </p:spTree>
     <p:extLst>
       <p:ext uri="{BB962C8B-B14F-4D97-AF65-F5344CB8AC3E}">
-        <p14:creationId xmlns:p14="http://schemas.microsoft.com/office/powerpoint/2010/main" val="3359080727"/>
+        <p14:creationId xmlns:p14="http://schemas.microsoft.com/office/powerpoint/2010/main" val="886500891"/>
       </p:ext>
     </p:extLst>
   </p:cSld>
@@ -1159,8 +1164,8 @@
         </p:nvSpPr>
         <p:spPr>
           <a:xfrm>
-            <a:off x="5234940" y="194733"/>
-            <a:ext cx="1577340" cy="3099647"/>
+            <a:off x="4730532" y="165489"/>
+            <a:ext cx="1425357" cy="2634162"/>
           </a:xfrm>
         </p:spPr>
         <p:txBody>
@@ -1187,8 +1192,8 @@
         </p:nvSpPr>
         <p:spPr>
           <a:xfrm>
-            <a:off x="502920" y="194733"/>
-            <a:ext cx="4640580" cy="3099647"/>
+            <a:off x="454461" y="165489"/>
+            <a:ext cx="4193441" cy="2634162"/>
           </a:xfrm>
         </p:spPr>
         <p:txBody>
@@ -1249,7 +1254,7 @@
           <a:p>
             <a:fld id="{9FF62ED1-3F4C-4576-9568-E8EF953AA21A}" type="datetimeFigureOut">
               <a:rPr lang="en-US" smtClean="0"/>
-              <a:t>2/19/2021</a:t>
+              <a:t>2/23/2021</a:t>
             </a:fld>
             <a:endParaRPr lang="en-US"/>
           </a:p>
@@ -1300,7 +1305,7 @@
     </p:spTree>
     <p:extLst>
       <p:ext uri="{BB962C8B-B14F-4D97-AF65-F5344CB8AC3E}">
-        <p14:creationId xmlns:p14="http://schemas.microsoft.com/office/powerpoint/2010/main" val="1077691218"/>
+        <p14:creationId xmlns:p14="http://schemas.microsoft.com/office/powerpoint/2010/main" val="1263692870"/>
       </p:ext>
     </p:extLst>
   </p:cSld>
@@ -1419,7 +1424,7 @@
           <a:p>
             <a:fld id="{9FF62ED1-3F4C-4576-9568-E8EF953AA21A}" type="datetimeFigureOut">
               <a:rPr lang="en-US" smtClean="0"/>
-              <a:t>2/19/2021</a:t>
+              <a:t>2/23/2021</a:t>
             </a:fld>
             <a:endParaRPr lang="en-US"/>
           </a:p>
@@ -1470,7 +1475,7 @@
     </p:spTree>
     <p:extLst>
       <p:ext uri="{BB962C8B-B14F-4D97-AF65-F5344CB8AC3E}">
-        <p14:creationId xmlns:p14="http://schemas.microsoft.com/office/powerpoint/2010/main" val="1191557643"/>
+        <p14:creationId xmlns:p14="http://schemas.microsoft.com/office/powerpoint/2010/main" val="3358567605"/>
       </p:ext>
     </p:extLst>
   </p:cSld>
@@ -1509,15 +1514,15 @@
         </p:nvSpPr>
         <p:spPr>
           <a:xfrm>
-            <a:off x="499110" y="911860"/>
-            <a:ext cx="6309360" cy="1521460"/>
+            <a:off x="451019" y="774923"/>
+            <a:ext cx="5701427" cy="1292977"/>
           </a:xfrm>
         </p:spPr>
         <p:txBody>
           <a:bodyPr anchor="b"/>
           <a:lstStyle>
             <a:lvl1pPr>
-              <a:defRPr sz="3200"/>
+              <a:defRPr sz="2719"/>
             </a:lvl1pPr>
           </a:lstStyle>
           <a:p>
@@ -1541,8 +1546,8 @@
         </p:nvSpPr>
         <p:spPr>
           <a:xfrm>
-            <a:off x="499110" y="2447714"/>
-            <a:ext cx="6309360" cy="800100"/>
+            <a:off x="451019" y="2080132"/>
+            <a:ext cx="5701427" cy="679946"/>
           </a:xfrm>
         </p:spPr>
         <p:txBody>
@@ -1550,7 +1555,7 @@
           <a:lstStyle>
             <a:lvl1pPr marL="0" indent="0">
               <a:buNone/>
-              <a:defRPr sz="1280">
+              <a:defRPr sz="1088">
                 <a:solidFill>
                   <a:schemeClr val="tx1">
                     <a:tint val="75000"/>
@@ -1558,9 +1563,9 @@
                 </a:solidFill>
               </a:defRPr>
             </a:lvl1pPr>
-            <a:lvl2pPr marL="243825" indent="0">
-              <a:buNone/>
-              <a:defRPr sz="1067">
+            <a:lvl2pPr marL="207203" indent="0">
+              <a:buNone/>
+              <a:defRPr sz="906">
                 <a:solidFill>
                   <a:schemeClr val="tx1">
                     <a:tint val="75000"/>
@@ -1568,9 +1573,9 @@
                 </a:solidFill>
               </a:defRPr>
             </a:lvl2pPr>
-            <a:lvl3pPr marL="487650" indent="0">
-              <a:buNone/>
-              <a:defRPr sz="960">
+            <a:lvl3pPr marL="414406" indent="0">
+              <a:buNone/>
+              <a:defRPr sz="816">
                 <a:solidFill>
                   <a:schemeClr val="tx1">
                     <a:tint val="75000"/>
@@ -1578,9 +1583,9 @@
                 </a:solidFill>
               </a:defRPr>
             </a:lvl3pPr>
-            <a:lvl4pPr marL="731474" indent="0">
-              <a:buNone/>
-              <a:defRPr sz="853">
+            <a:lvl4pPr marL="621609" indent="0">
+              <a:buNone/>
+              <a:defRPr sz="725">
                 <a:solidFill>
                   <a:schemeClr val="tx1">
                     <a:tint val="75000"/>
@@ -1588,9 +1593,9 @@
                 </a:solidFill>
               </a:defRPr>
             </a:lvl4pPr>
-            <a:lvl5pPr marL="975299" indent="0">
-              <a:buNone/>
-              <a:defRPr sz="853">
+            <a:lvl5pPr marL="828812" indent="0">
+              <a:buNone/>
+              <a:defRPr sz="725">
                 <a:solidFill>
                   <a:schemeClr val="tx1">
                     <a:tint val="75000"/>
@@ -1598,9 +1603,9 @@
                 </a:solidFill>
               </a:defRPr>
             </a:lvl5pPr>
-            <a:lvl6pPr marL="1219124" indent="0">
-              <a:buNone/>
-              <a:defRPr sz="853">
+            <a:lvl6pPr marL="1036015" indent="0">
+              <a:buNone/>
+              <a:defRPr sz="725">
                 <a:solidFill>
                   <a:schemeClr val="tx1">
                     <a:tint val="75000"/>
@@ -1608,9 +1613,9 @@
                 </a:solidFill>
               </a:defRPr>
             </a:lvl6pPr>
-            <a:lvl7pPr marL="1462949" indent="0">
-              <a:buNone/>
-              <a:defRPr sz="853">
+            <a:lvl7pPr marL="1243218" indent="0">
+              <a:buNone/>
+              <a:defRPr sz="725">
                 <a:solidFill>
                   <a:schemeClr val="tx1">
                     <a:tint val="75000"/>
@@ -1618,9 +1623,9 @@
                 </a:solidFill>
               </a:defRPr>
             </a:lvl7pPr>
-            <a:lvl8pPr marL="1706773" indent="0">
-              <a:buNone/>
-              <a:defRPr sz="853">
+            <a:lvl8pPr marL="1450421" indent="0">
+              <a:buNone/>
+              <a:defRPr sz="725">
                 <a:solidFill>
                   <a:schemeClr val="tx1">
                     <a:tint val="75000"/>
@@ -1628,9 +1633,9 @@
                 </a:solidFill>
               </a:defRPr>
             </a:lvl8pPr>
-            <a:lvl9pPr marL="1950598" indent="0">
-              <a:buNone/>
-              <a:defRPr sz="853">
+            <a:lvl9pPr marL="1657624" indent="0">
+              <a:buNone/>
+              <a:defRPr sz="725">
                 <a:solidFill>
                   <a:schemeClr val="tx1">
                     <a:tint val="75000"/>
@@ -1665,7 +1670,7 @@
           <a:p>
             <a:fld id="{9FF62ED1-3F4C-4576-9568-E8EF953AA21A}" type="datetimeFigureOut">
               <a:rPr lang="en-US" smtClean="0"/>
-              <a:t>2/19/2021</a:t>
+              <a:t>2/23/2021</a:t>
             </a:fld>
             <a:endParaRPr lang="en-US"/>
           </a:p>
@@ -1716,7 +1721,7 @@
     </p:spTree>
     <p:extLst>
       <p:ext uri="{BB962C8B-B14F-4D97-AF65-F5344CB8AC3E}">
-        <p14:creationId xmlns:p14="http://schemas.microsoft.com/office/powerpoint/2010/main" val="1857961498"/>
+        <p14:creationId xmlns:p14="http://schemas.microsoft.com/office/powerpoint/2010/main" val="285548387"/>
       </p:ext>
     </p:extLst>
   </p:cSld>
@@ -1778,8 +1783,8 @@
         </p:nvSpPr>
         <p:spPr>
           <a:xfrm>
-            <a:off x="502920" y="973666"/>
-            <a:ext cx="3108960" cy="2320714"/>
+            <a:off x="454461" y="827447"/>
+            <a:ext cx="2809399" cy="1972204"/>
           </a:xfrm>
         </p:spPr>
         <p:txBody>
@@ -1835,8 +1840,8 @@
         </p:nvSpPr>
         <p:spPr>
           <a:xfrm>
-            <a:off x="3703320" y="973666"/>
-            <a:ext cx="3108960" cy="2320714"/>
+            <a:off x="3346490" y="827447"/>
+            <a:ext cx="2809399" cy="1972204"/>
           </a:xfrm>
         </p:spPr>
         <p:txBody>
@@ -1897,7 +1902,7 @@
           <a:p>
             <a:fld id="{9FF62ED1-3F4C-4576-9568-E8EF953AA21A}" type="datetimeFigureOut">
               <a:rPr lang="en-US" smtClean="0"/>
-              <a:t>2/19/2021</a:t>
+              <a:t>2/23/2021</a:t>
             </a:fld>
             <a:endParaRPr lang="en-US"/>
           </a:p>
@@ -1948,7 +1953,7 @@
     </p:spTree>
     <p:extLst>
       <p:ext uri="{BB962C8B-B14F-4D97-AF65-F5344CB8AC3E}">
-        <p14:creationId xmlns:p14="http://schemas.microsoft.com/office/powerpoint/2010/main" val="2720140161"/>
+        <p14:creationId xmlns:p14="http://schemas.microsoft.com/office/powerpoint/2010/main" val="536532215"/>
       </p:ext>
     </p:extLst>
   </p:cSld>
@@ -1987,8 +1992,8 @@
         </p:nvSpPr>
         <p:spPr>
           <a:xfrm>
-            <a:off x="503873" y="194734"/>
-            <a:ext cx="6309360" cy="706967"/>
+            <a:off x="455322" y="165490"/>
+            <a:ext cx="5701427" cy="600799"/>
           </a:xfrm>
         </p:spPr>
         <p:txBody>
@@ -2015,8 +2020,8 @@
         </p:nvSpPr>
         <p:spPr>
           <a:xfrm>
-            <a:off x="503873" y="896620"/>
-            <a:ext cx="3094672" cy="439420"/>
+            <a:off x="455323" y="761972"/>
+            <a:ext cx="2796488" cy="373430"/>
           </a:xfrm>
         </p:spPr>
         <p:txBody>
@@ -2024,39 +2029,39 @@
           <a:lstStyle>
             <a:lvl1pPr marL="0" indent="0">
               <a:buNone/>
-              <a:defRPr sz="1280" b="1"/>
+              <a:defRPr sz="1088" b="1"/>
             </a:lvl1pPr>
-            <a:lvl2pPr marL="243825" indent="0">
-              <a:buNone/>
-              <a:defRPr sz="1067" b="1"/>
+            <a:lvl2pPr marL="207203" indent="0">
+              <a:buNone/>
+              <a:defRPr sz="906" b="1"/>
             </a:lvl2pPr>
-            <a:lvl3pPr marL="487650" indent="0">
-              <a:buNone/>
-              <a:defRPr sz="960" b="1"/>
+            <a:lvl3pPr marL="414406" indent="0">
+              <a:buNone/>
+              <a:defRPr sz="816" b="1"/>
             </a:lvl3pPr>
-            <a:lvl4pPr marL="731474" indent="0">
-              <a:buNone/>
-              <a:defRPr sz="853" b="1"/>
+            <a:lvl4pPr marL="621609" indent="0">
+              <a:buNone/>
+              <a:defRPr sz="725" b="1"/>
             </a:lvl4pPr>
-            <a:lvl5pPr marL="975299" indent="0">
-              <a:buNone/>
-              <a:defRPr sz="853" b="1"/>
+            <a:lvl5pPr marL="828812" indent="0">
+              <a:buNone/>
+              <a:defRPr sz="725" b="1"/>
             </a:lvl5pPr>
-            <a:lvl6pPr marL="1219124" indent="0">
-              <a:buNone/>
-              <a:defRPr sz="853" b="1"/>
+            <a:lvl6pPr marL="1036015" indent="0">
+              <a:buNone/>
+              <a:defRPr sz="725" b="1"/>
             </a:lvl6pPr>
-            <a:lvl7pPr marL="1462949" indent="0">
-              <a:buNone/>
-              <a:defRPr sz="853" b="1"/>
+            <a:lvl7pPr marL="1243218" indent="0">
+              <a:buNone/>
+              <a:defRPr sz="725" b="1"/>
             </a:lvl7pPr>
-            <a:lvl8pPr marL="1706773" indent="0">
-              <a:buNone/>
-              <a:defRPr sz="853" b="1"/>
+            <a:lvl8pPr marL="1450421" indent="0">
+              <a:buNone/>
+              <a:defRPr sz="725" b="1"/>
             </a:lvl8pPr>
-            <a:lvl9pPr marL="1950598" indent="0">
-              <a:buNone/>
-              <a:defRPr sz="853" b="1"/>
+            <a:lvl9pPr marL="1657624" indent="0">
+              <a:buNone/>
+              <a:defRPr sz="725" b="1"/>
             </a:lvl9pPr>
           </a:lstStyle>
           <a:p>
@@ -2080,8 +2085,8 @@
         </p:nvSpPr>
         <p:spPr>
           <a:xfrm>
-            <a:off x="503873" y="1336040"/>
-            <a:ext cx="3094672" cy="1965114"/>
+            <a:off x="455323" y="1135402"/>
+            <a:ext cx="2796488" cy="1670005"/>
           </a:xfrm>
         </p:spPr>
         <p:txBody>
@@ -2137,8 +2142,8 @@
         </p:nvSpPr>
         <p:spPr>
           <a:xfrm>
-            <a:off x="3703320" y="896620"/>
-            <a:ext cx="3109913" cy="439420"/>
+            <a:off x="3346490" y="761972"/>
+            <a:ext cx="2810260" cy="373430"/>
           </a:xfrm>
         </p:spPr>
         <p:txBody>
@@ -2146,39 +2151,39 @@
           <a:lstStyle>
             <a:lvl1pPr marL="0" indent="0">
               <a:buNone/>
-              <a:defRPr sz="1280" b="1"/>
+              <a:defRPr sz="1088" b="1"/>
             </a:lvl1pPr>
-            <a:lvl2pPr marL="243825" indent="0">
-              <a:buNone/>
-              <a:defRPr sz="1067" b="1"/>
+            <a:lvl2pPr marL="207203" indent="0">
+              <a:buNone/>
+              <a:defRPr sz="906" b="1"/>
             </a:lvl2pPr>
-            <a:lvl3pPr marL="487650" indent="0">
-              <a:buNone/>
-              <a:defRPr sz="960" b="1"/>
+            <a:lvl3pPr marL="414406" indent="0">
+              <a:buNone/>
+              <a:defRPr sz="816" b="1"/>
             </a:lvl3pPr>
-            <a:lvl4pPr marL="731474" indent="0">
-              <a:buNone/>
-              <a:defRPr sz="853" b="1"/>
+            <a:lvl4pPr marL="621609" indent="0">
+              <a:buNone/>
+              <a:defRPr sz="725" b="1"/>
             </a:lvl4pPr>
-            <a:lvl5pPr marL="975299" indent="0">
-              <a:buNone/>
-              <a:defRPr sz="853" b="1"/>
+            <a:lvl5pPr marL="828812" indent="0">
+              <a:buNone/>
+              <a:defRPr sz="725" b="1"/>
             </a:lvl5pPr>
-            <a:lvl6pPr marL="1219124" indent="0">
-              <a:buNone/>
-              <a:defRPr sz="853" b="1"/>
+            <a:lvl6pPr marL="1036015" indent="0">
+              <a:buNone/>
+              <a:defRPr sz="725" b="1"/>
             </a:lvl6pPr>
-            <a:lvl7pPr marL="1462949" indent="0">
-              <a:buNone/>
-              <a:defRPr sz="853" b="1"/>
+            <a:lvl7pPr marL="1243218" indent="0">
+              <a:buNone/>
+              <a:defRPr sz="725" b="1"/>
             </a:lvl7pPr>
-            <a:lvl8pPr marL="1706773" indent="0">
-              <a:buNone/>
-              <a:defRPr sz="853" b="1"/>
+            <a:lvl8pPr marL="1450421" indent="0">
+              <a:buNone/>
+              <a:defRPr sz="725" b="1"/>
             </a:lvl8pPr>
-            <a:lvl9pPr marL="1950598" indent="0">
-              <a:buNone/>
-              <a:defRPr sz="853" b="1"/>
+            <a:lvl9pPr marL="1657624" indent="0">
+              <a:buNone/>
+              <a:defRPr sz="725" b="1"/>
             </a:lvl9pPr>
           </a:lstStyle>
           <a:p>
@@ -2202,8 +2207,8 @@
         </p:nvSpPr>
         <p:spPr>
           <a:xfrm>
-            <a:off x="3703320" y="1336040"/>
-            <a:ext cx="3109913" cy="1965114"/>
+            <a:off x="3346490" y="1135402"/>
+            <a:ext cx="2810260" cy="1670005"/>
           </a:xfrm>
         </p:spPr>
         <p:txBody>
@@ -2264,7 +2269,7 @@
           <a:p>
             <a:fld id="{9FF62ED1-3F4C-4576-9568-E8EF953AA21A}" type="datetimeFigureOut">
               <a:rPr lang="en-US" smtClean="0"/>
-              <a:t>2/19/2021</a:t>
+              <a:t>2/23/2021</a:t>
             </a:fld>
             <a:endParaRPr lang="en-US"/>
           </a:p>
@@ -2315,7 +2320,7 @@
     </p:spTree>
     <p:extLst>
       <p:ext uri="{BB962C8B-B14F-4D97-AF65-F5344CB8AC3E}">
-        <p14:creationId xmlns:p14="http://schemas.microsoft.com/office/powerpoint/2010/main" val="2622974860"/>
+        <p14:creationId xmlns:p14="http://schemas.microsoft.com/office/powerpoint/2010/main" val="3385228612"/>
       </p:ext>
     </p:extLst>
   </p:cSld>
@@ -2382,7 +2387,7 @@
           <a:p>
             <a:fld id="{9FF62ED1-3F4C-4576-9568-E8EF953AA21A}" type="datetimeFigureOut">
               <a:rPr lang="en-US" smtClean="0"/>
-              <a:t>2/19/2021</a:t>
+              <a:t>2/23/2021</a:t>
             </a:fld>
             <a:endParaRPr lang="en-US"/>
           </a:p>
@@ -2433,7 +2438,7 @@
     </p:spTree>
     <p:extLst>
       <p:ext uri="{BB962C8B-B14F-4D97-AF65-F5344CB8AC3E}">
-        <p14:creationId xmlns:p14="http://schemas.microsoft.com/office/powerpoint/2010/main" val="1598739004"/>
+        <p14:creationId xmlns:p14="http://schemas.microsoft.com/office/powerpoint/2010/main" val="2663696260"/>
       </p:ext>
     </p:extLst>
   </p:cSld>
@@ -2477,7 +2482,7 @@
           <a:p>
             <a:fld id="{9FF62ED1-3F4C-4576-9568-E8EF953AA21A}" type="datetimeFigureOut">
               <a:rPr lang="en-US" smtClean="0"/>
-              <a:t>2/19/2021</a:t>
+              <a:t>2/23/2021</a:t>
             </a:fld>
             <a:endParaRPr lang="en-US"/>
           </a:p>
@@ -2528,7 +2533,7 @@
     </p:spTree>
     <p:extLst>
       <p:ext uri="{BB962C8B-B14F-4D97-AF65-F5344CB8AC3E}">
-        <p14:creationId xmlns:p14="http://schemas.microsoft.com/office/powerpoint/2010/main" val="3613271662"/>
+        <p14:creationId xmlns:p14="http://schemas.microsoft.com/office/powerpoint/2010/main" val="4163621157"/>
       </p:ext>
     </p:extLst>
   </p:cSld>
@@ -2567,15 +2572,15 @@
         </p:nvSpPr>
         <p:spPr>
           <a:xfrm>
-            <a:off x="503873" y="243840"/>
-            <a:ext cx="2359342" cy="853440"/>
+            <a:off x="455323" y="207222"/>
+            <a:ext cx="2132010" cy="725276"/>
           </a:xfrm>
         </p:spPr>
         <p:txBody>
           <a:bodyPr anchor="b"/>
           <a:lstStyle>
             <a:lvl1pPr>
-              <a:defRPr sz="1707"/>
+              <a:defRPr sz="1450"/>
             </a:lvl1pPr>
           </a:lstStyle>
           <a:p>
@@ -2599,39 +2604,39 @@
         </p:nvSpPr>
         <p:spPr>
           <a:xfrm>
-            <a:off x="3109913" y="526627"/>
-            <a:ext cx="3703320" cy="2599267"/>
+            <a:off x="2810260" y="447542"/>
+            <a:ext cx="3346490" cy="2208925"/>
           </a:xfrm>
         </p:spPr>
         <p:txBody>
           <a:bodyPr/>
           <a:lstStyle>
             <a:lvl1pPr>
-              <a:defRPr sz="1707"/>
+              <a:defRPr sz="1450"/>
             </a:lvl1pPr>
             <a:lvl2pPr>
-              <a:defRPr sz="1493"/>
+              <a:defRPr sz="1269"/>
             </a:lvl2pPr>
             <a:lvl3pPr>
-              <a:defRPr sz="1280"/>
+              <a:defRPr sz="1088"/>
             </a:lvl3pPr>
             <a:lvl4pPr>
-              <a:defRPr sz="1067"/>
+              <a:defRPr sz="906"/>
             </a:lvl4pPr>
             <a:lvl5pPr>
-              <a:defRPr sz="1067"/>
+              <a:defRPr sz="906"/>
             </a:lvl5pPr>
             <a:lvl6pPr>
-              <a:defRPr sz="1067"/>
+              <a:defRPr sz="906"/>
             </a:lvl6pPr>
             <a:lvl7pPr>
-              <a:defRPr sz="1067"/>
+              <a:defRPr sz="906"/>
             </a:lvl7pPr>
             <a:lvl8pPr>
-              <a:defRPr sz="1067"/>
+              <a:defRPr sz="906"/>
             </a:lvl8pPr>
             <a:lvl9pPr>
-              <a:defRPr sz="1067"/>
+              <a:defRPr sz="906"/>
             </a:lvl9pPr>
           </a:lstStyle>
           <a:p>
@@ -2684,8 +2689,8 @@
         </p:nvSpPr>
         <p:spPr>
           <a:xfrm>
-            <a:off x="503873" y="1097280"/>
-            <a:ext cx="2359342" cy="2032847"/>
+            <a:off x="455323" y="932497"/>
+            <a:ext cx="2132010" cy="1727567"/>
           </a:xfrm>
         </p:spPr>
         <p:txBody>
@@ -2693,39 +2698,39 @@
           <a:lstStyle>
             <a:lvl1pPr marL="0" indent="0">
               <a:buNone/>
-              <a:defRPr sz="853"/>
+              <a:defRPr sz="725"/>
             </a:lvl1pPr>
-            <a:lvl2pPr marL="243825" indent="0">
-              <a:buNone/>
-              <a:defRPr sz="747"/>
+            <a:lvl2pPr marL="207203" indent="0">
+              <a:buNone/>
+              <a:defRPr sz="634"/>
             </a:lvl2pPr>
-            <a:lvl3pPr marL="487650" indent="0">
-              <a:buNone/>
-              <a:defRPr sz="640"/>
+            <a:lvl3pPr marL="414406" indent="0">
+              <a:buNone/>
+              <a:defRPr sz="544"/>
             </a:lvl3pPr>
-            <a:lvl4pPr marL="731474" indent="0">
-              <a:buNone/>
-              <a:defRPr sz="533"/>
+            <a:lvl4pPr marL="621609" indent="0">
+              <a:buNone/>
+              <a:defRPr sz="453"/>
             </a:lvl4pPr>
-            <a:lvl5pPr marL="975299" indent="0">
-              <a:buNone/>
-              <a:defRPr sz="533"/>
+            <a:lvl5pPr marL="828812" indent="0">
+              <a:buNone/>
+              <a:defRPr sz="453"/>
             </a:lvl5pPr>
-            <a:lvl6pPr marL="1219124" indent="0">
-              <a:buNone/>
-              <a:defRPr sz="533"/>
+            <a:lvl6pPr marL="1036015" indent="0">
+              <a:buNone/>
+              <a:defRPr sz="453"/>
             </a:lvl6pPr>
-            <a:lvl7pPr marL="1462949" indent="0">
-              <a:buNone/>
-              <a:defRPr sz="533"/>
+            <a:lvl7pPr marL="1243218" indent="0">
+              <a:buNone/>
+              <a:defRPr sz="453"/>
             </a:lvl7pPr>
-            <a:lvl8pPr marL="1706773" indent="0">
-              <a:buNone/>
-              <a:defRPr sz="533"/>
+            <a:lvl8pPr marL="1450421" indent="0">
+              <a:buNone/>
+              <a:defRPr sz="453"/>
             </a:lvl8pPr>
-            <a:lvl9pPr marL="1950598" indent="0">
-              <a:buNone/>
-              <a:defRPr sz="533"/>
+            <a:lvl9pPr marL="1657624" indent="0">
+              <a:buNone/>
+              <a:defRPr sz="453"/>
             </a:lvl9pPr>
           </a:lstStyle>
           <a:p>
@@ -2754,7 +2759,7 @@
           <a:p>
             <a:fld id="{9FF62ED1-3F4C-4576-9568-E8EF953AA21A}" type="datetimeFigureOut">
               <a:rPr lang="en-US" smtClean="0"/>
-              <a:t>2/19/2021</a:t>
+              <a:t>2/23/2021</a:t>
             </a:fld>
             <a:endParaRPr lang="en-US"/>
           </a:p>
@@ -2805,7 +2810,7 @@
     </p:spTree>
     <p:extLst>
       <p:ext uri="{BB962C8B-B14F-4D97-AF65-F5344CB8AC3E}">
-        <p14:creationId xmlns:p14="http://schemas.microsoft.com/office/powerpoint/2010/main" val="946634820"/>
+        <p14:creationId xmlns:p14="http://schemas.microsoft.com/office/powerpoint/2010/main" val="2144240636"/>
       </p:ext>
     </p:extLst>
   </p:cSld>
@@ -2844,15 +2849,15 @@
         </p:nvSpPr>
         <p:spPr>
           <a:xfrm>
-            <a:off x="503873" y="243840"/>
-            <a:ext cx="2359342" cy="853440"/>
+            <a:off x="455323" y="207222"/>
+            <a:ext cx="2132010" cy="725276"/>
           </a:xfrm>
         </p:spPr>
         <p:txBody>
           <a:bodyPr anchor="b"/>
           <a:lstStyle>
             <a:lvl1pPr>
-              <a:defRPr sz="1707"/>
+              <a:defRPr sz="1450"/>
             </a:lvl1pPr>
           </a:lstStyle>
           <a:p>
@@ -2876,8 +2881,8 @@
         </p:nvSpPr>
         <p:spPr>
           <a:xfrm>
-            <a:off x="3109913" y="526627"/>
-            <a:ext cx="3703320" cy="2599267"/>
+            <a:off x="2810260" y="447542"/>
+            <a:ext cx="3346490" cy="2208925"/>
           </a:xfrm>
         </p:spPr>
         <p:txBody>
@@ -2885,39 +2890,39 @@
           <a:lstStyle>
             <a:lvl1pPr marL="0" indent="0">
               <a:buNone/>
-              <a:defRPr sz="1707"/>
+              <a:defRPr sz="1450"/>
             </a:lvl1pPr>
-            <a:lvl2pPr marL="243825" indent="0">
-              <a:buNone/>
-              <a:defRPr sz="1493"/>
+            <a:lvl2pPr marL="207203" indent="0">
+              <a:buNone/>
+              <a:defRPr sz="1269"/>
             </a:lvl2pPr>
-            <a:lvl3pPr marL="487650" indent="0">
-              <a:buNone/>
-              <a:defRPr sz="1280"/>
+            <a:lvl3pPr marL="414406" indent="0">
+              <a:buNone/>
+              <a:defRPr sz="1088"/>
             </a:lvl3pPr>
-            <a:lvl4pPr marL="731474" indent="0">
-              <a:buNone/>
-              <a:defRPr sz="1067"/>
+            <a:lvl4pPr marL="621609" indent="0">
+              <a:buNone/>
+              <a:defRPr sz="906"/>
             </a:lvl4pPr>
-            <a:lvl5pPr marL="975299" indent="0">
-              <a:buNone/>
-              <a:defRPr sz="1067"/>
+            <a:lvl5pPr marL="828812" indent="0">
+              <a:buNone/>
+              <a:defRPr sz="906"/>
             </a:lvl5pPr>
-            <a:lvl6pPr marL="1219124" indent="0">
-              <a:buNone/>
-              <a:defRPr sz="1067"/>
+            <a:lvl6pPr marL="1036015" indent="0">
+              <a:buNone/>
+              <a:defRPr sz="906"/>
             </a:lvl6pPr>
-            <a:lvl7pPr marL="1462949" indent="0">
-              <a:buNone/>
-              <a:defRPr sz="1067"/>
+            <a:lvl7pPr marL="1243218" indent="0">
+              <a:buNone/>
+              <a:defRPr sz="906"/>
             </a:lvl7pPr>
-            <a:lvl8pPr marL="1706773" indent="0">
-              <a:buNone/>
-              <a:defRPr sz="1067"/>
+            <a:lvl8pPr marL="1450421" indent="0">
+              <a:buNone/>
+              <a:defRPr sz="906"/>
             </a:lvl8pPr>
-            <a:lvl9pPr marL="1950598" indent="0">
-              <a:buNone/>
-              <a:defRPr sz="1067"/>
+            <a:lvl9pPr marL="1657624" indent="0">
+              <a:buNone/>
+              <a:defRPr sz="906"/>
             </a:lvl9pPr>
           </a:lstStyle>
           <a:p>
@@ -2941,8 +2946,8 @@
         </p:nvSpPr>
         <p:spPr>
           <a:xfrm>
-            <a:off x="503873" y="1097280"/>
-            <a:ext cx="2359342" cy="2032847"/>
+            <a:off x="455323" y="932497"/>
+            <a:ext cx="2132010" cy="1727567"/>
           </a:xfrm>
         </p:spPr>
         <p:txBody>
@@ -2950,39 +2955,39 @@
           <a:lstStyle>
             <a:lvl1pPr marL="0" indent="0">
               <a:buNone/>
-              <a:defRPr sz="853"/>
+              <a:defRPr sz="725"/>
             </a:lvl1pPr>
-            <a:lvl2pPr marL="243825" indent="0">
-              <a:buNone/>
-              <a:defRPr sz="747"/>
+            <a:lvl2pPr marL="207203" indent="0">
+              <a:buNone/>
+              <a:defRPr sz="634"/>
             </a:lvl2pPr>
-            <a:lvl3pPr marL="487650" indent="0">
-              <a:buNone/>
-              <a:defRPr sz="640"/>
+            <a:lvl3pPr marL="414406" indent="0">
+              <a:buNone/>
+              <a:defRPr sz="544"/>
             </a:lvl3pPr>
-            <a:lvl4pPr marL="731474" indent="0">
-              <a:buNone/>
-              <a:defRPr sz="533"/>
+            <a:lvl4pPr marL="621609" indent="0">
+              <a:buNone/>
+              <a:defRPr sz="453"/>
             </a:lvl4pPr>
-            <a:lvl5pPr marL="975299" indent="0">
-              <a:buNone/>
-              <a:defRPr sz="533"/>
+            <a:lvl5pPr marL="828812" indent="0">
+              <a:buNone/>
+              <a:defRPr sz="453"/>
             </a:lvl5pPr>
-            <a:lvl6pPr marL="1219124" indent="0">
-              <a:buNone/>
-              <a:defRPr sz="533"/>
+            <a:lvl6pPr marL="1036015" indent="0">
+              <a:buNone/>
+              <a:defRPr sz="453"/>
             </a:lvl6pPr>
-            <a:lvl7pPr marL="1462949" indent="0">
-              <a:buNone/>
-              <a:defRPr sz="533"/>
+            <a:lvl7pPr marL="1243218" indent="0">
+              <a:buNone/>
+              <a:defRPr sz="453"/>
             </a:lvl7pPr>
-            <a:lvl8pPr marL="1706773" indent="0">
-              <a:buNone/>
-              <a:defRPr sz="533"/>
+            <a:lvl8pPr marL="1450421" indent="0">
+              <a:buNone/>
+              <a:defRPr sz="453"/>
             </a:lvl8pPr>
-            <a:lvl9pPr marL="1950598" indent="0">
-              <a:buNone/>
-              <a:defRPr sz="533"/>
+            <a:lvl9pPr marL="1657624" indent="0">
+              <a:buNone/>
+              <a:defRPr sz="453"/>
             </a:lvl9pPr>
           </a:lstStyle>
           <a:p>
@@ -3011,7 +3016,7 @@
           <a:p>
             <a:fld id="{9FF62ED1-3F4C-4576-9568-E8EF953AA21A}" type="datetimeFigureOut">
               <a:rPr lang="en-US" smtClean="0"/>
-              <a:t>2/19/2021</a:t>
+              <a:t>2/23/2021</a:t>
             </a:fld>
             <a:endParaRPr lang="en-US"/>
           </a:p>
@@ -3062,7 +3067,7 @@
     </p:spTree>
     <p:extLst>
       <p:ext uri="{BB962C8B-B14F-4D97-AF65-F5344CB8AC3E}">
-        <p14:creationId xmlns:p14="http://schemas.microsoft.com/office/powerpoint/2010/main" val="2742871122"/>
+        <p14:creationId xmlns:p14="http://schemas.microsoft.com/office/powerpoint/2010/main" val="3429008342"/>
       </p:ext>
     </p:extLst>
   </p:cSld>
@@ -3106,8 +3111,8 @@
         </p:nvSpPr>
         <p:spPr>
           <a:xfrm>
-            <a:off x="502920" y="194734"/>
-            <a:ext cx="6309360" cy="706967"/>
+            <a:off x="454462" y="165490"/>
+            <a:ext cx="5701427" cy="600799"/>
           </a:xfrm>
           <a:prstGeom prst="rect">
             <a:avLst/>
@@ -3139,8 +3144,8 @@
         </p:nvSpPr>
         <p:spPr>
           <a:xfrm>
-            <a:off x="502920" y="973666"/>
-            <a:ext cx="6309360" cy="2320714"/>
+            <a:off x="454462" y="827447"/>
+            <a:ext cx="5701427" cy="1972204"/>
           </a:xfrm>
           <a:prstGeom prst="rect">
             <a:avLst/>
@@ -3201,8 +3206,8 @@
         </p:nvSpPr>
         <p:spPr>
           <a:xfrm>
-            <a:off x="502920" y="3390054"/>
-            <a:ext cx="1645920" cy="194733"/>
+            <a:off x="454461" y="2880957"/>
+            <a:ext cx="1487329" cy="165490"/>
           </a:xfrm>
           <a:prstGeom prst="rect">
             <a:avLst/>
@@ -3212,7 +3217,7 @@
           <a:bodyPr vert="horz" lIns="91440" tIns="45720" rIns="91440" bIns="45720" rtlCol="0" anchor="ctr"/>
           <a:lstStyle>
             <a:lvl1pPr algn="l">
-              <a:defRPr sz="640">
+              <a:defRPr sz="544">
                 <a:solidFill>
                   <a:schemeClr val="tx1">
                     <a:tint val="75000"/>
@@ -3224,7 +3229,7 @@
           <a:p>
             <a:fld id="{9FF62ED1-3F4C-4576-9568-E8EF953AA21A}" type="datetimeFigureOut">
               <a:rPr lang="en-US" smtClean="0"/>
-              <a:t>2/19/2021</a:t>
+              <a:t>2/23/2021</a:t>
             </a:fld>
             <a:endParaRPr lang="en-US"/>
           </a:p>
@@ -3242,8 +3247,8 @@
         </p:nvSpPr>
         <p:spPr>
           <a:xfrm>
-            <a:off x="2423160" y="3390054"/>
-            <a:ext cx="2468880" cy="194733"/>
+            <a:off x="2189679" y="2880957"/>
+            <a:ext cx="2230993" cy="165490"/>
           </a:xfrm>
           <a:prstGeom prst="rect">
             <a:avLst/>
@@ -3253,7 +3258,7 @@
           <a:bodyPr vert="horz" lIns="91440" tIns="45720" rIns="91440" bIns="45720" rtlCol="0" anchor="ctr"/>
           <a:lstStyle>
             <a:lvl1pPr algn="ctr">
-              <a:defRPr sz="640">
+              <a:defRPr sz="544">
                 <a:solidFill>
                   <a:schemeClr val="tx1">
                     <a:tint val="75000"/>
@@ -3279,8 +3284,8 @@
         </p:nvSpPr>
         <p:spPr>
           <a:xfrm>
-            <a:off x="5166360" y="3390054"/>
-            <a:ext cx="1645920" cy="194733"/>
+            <a:off x="4668560" y="2880957"/>
+            <a:ext cx="1487329" cy="165490"/>
           </a:xfrm>
           <a:prstGeom prst="rect">
             <a:avLst/>
@@ -3290,7 +3295,7 @@
           <a:bodyPr vert="horz" lIns="91440" tIns="45720" rIns="91440" bIns="45720" rtlCol="0" anchor="ctr"/>
           <a:lstStyle>
             <a:lvl1pPr algn="r">
-              <a:defRPr sz="640">
+              <a:defRPr sz="544">
                 <a:solidFill>
                   <a:schemeClr val="tx1">
                     <a:tint val="75000"/>
@@ -3311,27 +3316,27 @@
     </p:spTree>
     <p:extLst>
       <p:ext uri="{BB962C8B-B14F-4D97-AF65-F5344CB8AC3E}">
-        <p14:creationId xmlns:p14="http://schemas.microsoft.com/office/powerpoint/2010/main" val="1614150336"/>
+        <p14:creationId xmlns:p14="http://schemas.microsoft.com/office/powerpoint/2010/main" val="307569766"/>
       </p:ext>
     </p:extLst>
   </p:cSld>
   <p:clrMap bg1="lt1" tx1="dk1" bg2="lt2" tx2="dk2" accent1="accent1" accent2="accent2" accent3="accent3" accent4="accent4" accent5="accent5" accent6="accent6" hlink="hlink" folHlink="folHlink"/>
   <p:sldLayoutIdLst>
-    <p:sldLayoutId id="2147483721" r:id="rId1"/>
-    <p:sldLayoutId id="2147483722" r:id="rId2"/>
-    <p:sldLayoutId id="2147483723" r:id="rId3"/>
-    <p:sldLayoutId id="2147483724" r:id="rId4"/>
-    <p:sldLayoutId id="2147483725" r:id="rId5"/>
-    <p:sldLayoutId id="2147483726" r:id="rId6"/>
-    <p:sldLayoutId id="2147483727" r:id="rId7"/>
-    <p:sldLayoutId id="2147483728" r:id="rId8"/>
-    <p:sldLayoutId id="2147483729" r:id="rId9"/>
-    <p:sldLayoutId id="2147483730" r:id="rId10"/>
-    <p:sldLayoutId id="2147483731" r:id="rId11"/>
+    <p:sldLayoutId id="2147483793" r:id="rId1"/>
+    <p:sldLayoutId id="2147483794" r:id="rId2"/>
+    <p:sldLayoutId id="2147483795" r:id="rId3"/>
+    <p:sldLayoutId id="2147483796" r:id="rId4"/>
+    <p:sldLayoutId id="2147483797" r:id="rId5"/>
+    <p:sldLayoutId id="2147483798" r:id="rId6"/>
+    <p:sldLayoutId id="2147483799" r:id="rId7"/>
+    <p:sldLayoutId id="2147483800" r:id="rId8"/>
+    <p:sldLayoutId id="2147483801" r:id="rId9"/>
+    <p:sldLayoutId id="2147483802" r:id="rId10"/>
+    <p:sldLayoutId id="2147483803" r:id="rId11"/>
   </p:sldLayoutIdLst>
   <p:txStyles>
     <p:titleStyle>
-      <a:lvl1pPr algn="l" defTabSz="487650" rtl="0" eaLnBrk="1" latinLnBrk="0" hangingPunct="1">
+      <a:lvl1pPr algn="l" defTabSz="414406" rtl="0" eaLnBrk="1" latinLnBrk="0" hangingPunct="1">
         <a:lnSpc>
           <a:spcPct val="90000"/>
         </a:lnSpc>
@@ -3339,7 +3344,7 @@
           <a:spcPct val="0"/>
         </a:spcBef>
         <a:buNone/>
-        <a:defRPr sz="2347" kern="1200">
+        <a:defRPr sz="1994" kern="1200">
           <a:solidFill>
             <a:schemeClr val="tx1"/>
           </a:solidFill>
@@ -3350,16 +3355,16 @@
       </a:lvl1pPr>
     </p:titleStyle>
     <p:bodyStyle>
-      <a:lvl1pPr marL="121912" indent="-121912" algn="l" defTabSz="487650" rtl="0" eaLnBrk="1" latinLnBrk="0" hangingPunct="1">
+      <a:lvl1pPr marL="103602" indent="-103602" algn="l" defTabSz="414406" rtl="0" eaLnBrk="1" latinLnBrk="0" hangingPunct="1">
         <a:lnSpc>
           <a:spcPct val="90000"/>
         </a:lnSpc>
         <a:spcBef>
-          <a:spcPts val="533"/>
+          <a:spcPts val="453"/>
         </a:spcBef>
         <a:buFont typeface="Arial" panose="020B0604020202020204" pitchFamily="34" charset="0"/>
         <a:buChar char="•"/>
-        <a:defRPr sz="1493" kern="1200">
+        <a:defRPr sz="1269" kern="1200">
           <a:solidFill>
             <a:schemeClr val="tx1"/>
           </a:solidFill>
@@ -3368,16 +3373,16 @@
           <a:cs typeface="+mn-cs"/>
         </a:defRPr>
       </a:lvl1pPr>
-      <a:lvl2pPr marL="365737" indent="-121912" algn="l" defTabSz="487650" rtl="0" eaLnBrk="1" latinLnBrk="0" hangingPunct="1">
+      <a:lvl2pPr marL="310805" indent="-103602" algn="l" defTabSz="414406" rtl="0" eaLnBrk="1" latinLnBrk="0" hangingPunct="1">
         <a:lnSpc>
           <a:spcPct val="90000"/>
         </a:lnSpc>
         <a:spcBef>
-          <a:spcPts val="267"/>
+          <a:spcPts val="227"/>
         </a:spcBef>
         <a:buFont typeface="Arial" panose="020B0604020202020204" pitchFamily="34" charset="0"/>
         <a:buChar char="•"/>
-        <a:defRPr sz="1280" kern="1200">
+        <a:defRPr sz="1088" kern="1200">
           <a:solidFill>
             <a:schemeClr val="tx1"/>
           </a:solidFill>
@@ -3386,16 +3391,16 @@
           <a:cs typeface="+mn-cs"/>
         </a:defRPr>
       </a:lvl2pPr>
-      <a:lvl3pPr marL="609562" indent="-121912" algn="l" defTabSz="487650" rtl="0" eaLnBrk="1" latinLnBrk="0" hangingPunct="1">
+      <a:lvl3pPr marL="518008" indent="-103602" algn="l" defTabSz="414406" rtl="0" eaLnBrk="1" latinLnBrk="0" hangingPunct="1">
         <a:lnSpc>
           <a:spcPct val="90000"/>
         </a:lnSpc>
         <a:spcBef>
-          <a:spcPts val="267"/>
+          <a:spcPts val="227"/>
         </a:spcBef>
         <a:buFont typeface="Arial" panose="020B0604020202020204" pitchFamily="34" charset="0"/>
         <a:buChar char="•"/>
-        <a:defRPr sz="1067" kern="1200">
+        <a:defRPr sz="906" kern="1200">
           <a:solidFill>
             <a:schemeClr val="tx1"/>
           </a:solidFill>
@@ -3404,16 +3409,16 @@
           <a:cs typeface="+mn-cs"/>
         </a:defRPr>
       </a:lvl3pPr>
-      <a:lvl4pPr marL="853387" indent="-121912" algn="l" defTabSz="487650" rtl="0" eaLnBrk="1" latinLnBrk="0" hangingPunct="1">
+      <a:lvl4pPr marL="725211" indent="-103602" algn="l" defTabSz="414406" rtl="0" eaLnBrk="1" latinLnBrk="0" hangingPunct="1">
         <a:lnSpc>
           <a:spcPct val="90000"/>
         </a:lnSpc>
         <a:spcBef>
-          <a:spcPts val="267"/>
+          <a:spcPts val="227"/>
         </a:spcBef>
         <a:buFont typeface="Arial" panose="020B0604020202020204" pitchFamily="34" charset="0"/>
         <a:buChar char="•"/>
-        <a:defRPr sz="960" kern="1200">
+        <a:defRPr sz="816" kern="1200">
           <a:solidFill>
             <a:schemeClr val="tx1"/>
           </a:solidFill>
@@ -3422,16 +3427,16 @@
           <a:cs typeface="+mn-cs"/>
         </a:defRPr>
       </a:lvl4pPr>
-      <a:lvl5pPr marL="1097211" indent="-121912" algn="l" defTabSz="487650" rtl="0" eaLnBrk="1" latinLnBrk="0" hangingPunct="1">
+      <a:lvl5pPr marL="932414" indent="-103602" algn="l" defTabSz="414406" rtl="0" eaLnBrk="1" latinLnBrk="0" hangingPunct="1">
         <a:lnSpc>
           <a:spcPct val="90000"/>
         </a:lnSpc>
         <a:spcBef>
-          <a:spcPts val="267"/>
+          <a:spcPts val="227"/>
         </a:spcBef>
         <a:buFont typeface="Arial" panose="020B0604020202020204" pitchFamily="34" charset="0"/>
         <a:buChar char="•"/>
-        <a:defRPr sz="960" kern="1200">
+        <a:defRPr sz="816" kern="1200">
           <a:solidFill>
             <a:schemeClr val="tx1"/>
           </a:solidFill>
@@ -3440,16 +3445,16 @@
           <a:cs typeface="+mn-cs"/>
         </a:defRPr>
       </a:lvl5pPr>
-      <a:lvl6pPr marL="1341036" indent="-121912" algn="l" defTabSz="487650" rtl="0" eaLnBrk="1" latinLnBrk="0" hangingPunct="1">
+      <a:lvl6pPr marL="1139617" indent="-103602" algn="l" defTabSz="414406" rtl="0" eaLnBrk="1" latinLnBrk="0" hangingPunct="1">
         <a:lnSpc>
           <a:spcPct val="90000"/>
         </a:lnSpc>
         <a:spcBef>
-          <a:spcPts val="267"/>
+          <a:spcPts val="227"/>
         </a:spcBef>
         <a:buFont typeface="Arial" panose="020B0604020202020204" pitchFamily="34" charset="0"/>
         <a:buChar char="•"/>
-        <a:defRPr sz="960" kern="1200">
+        <a:defRPr sz="816" kern="1200">
           <a:solidFill>
             <a:schemeClr val="tx1"/>
           </a:solidFill>
@@ -3458,16 +3463,16 @@
           <a:cs typeface="+mn-cs"/>
         </a:defRPr>
       </a:lvl6pPr>
-      <a:lvl7pPr marL="1584861" indent="-121912" algn="l" defTabSz="487650" rtl="0" eaLnBrk="1" latinLnBrk="0" hangingPunct="1">
+      <a:lvl7pPr marL="1346820" indent="-103602" algn="l" defTabSz="414406" rtl="0" eaLnBrk="1" latinLnBrk="0" hangingPunct="1">
         <a:lnSpc>
           <a:spcPct val="90000"/>
         </a:lnSpc>
         <a:spcBef>
-          <a:spcPts val="267"/>
+          <a:spcPts val="227"/>
         </a:spcBef>
         <a:buFont typeface="Arial" panose="020B0604020202020204" pitchFamily="34" charset="0"/>
         <a:buChar char="•"/>
-        <a:defRPr sz="960" kern="1200">
+        <a:defRPr sz="816" kern="1200">
           <a:solidFill>
             <a:schemeClr val="tx1"/>
           </a:solidFill>
@@ -3476,16 +3481,16 @@
           <a:cs typeface="+mn-cs"/>
         </a:defRPr>
       </a:lvl7pPr>
-      <a:lvl8pPr marL="1828686" indent="-121912" algn="l" defTabSz="487650" rtl="0" eaLnBrk="1" latinLnBrk="0" hangingPunct="1">
+      <a:lvl8pPr marL="1554023" indent="-103602" algn="l" defTabSz="414406" rtl="0" eaLnBrk="1" latinLnBrk="0" hangingPunct="1">
         <a:lnSpc>
           <a:spcPct val="90000"/>
         </a:lnSpc>
         <a:spcBef>
-          <a:spcPts val="267"/>
+          <a:spcPts val="227"/>
         </a:spcBef>
         <a:buFont typeface="Arial" panose="020B0604020202020204" pitchFamily="34" charset="0"/>
         <a:buChar char="•"/>
-        <a:defRPr sz="960" kern="1200">
+        <a:defRPr sz="816" kern="1200">
           <a:solidFill>
             <a:schemeClr val="tx1"/>
           </a:solidFill>
@@ -3494,16 +3499,16 @@
           <a:cs typeface="+mn-cs"/>
         </a:defRPr>
       </a:lvl8pPr>
-      <a:lvl9pPr marL="2072510" indent="-121912" algn="l" defTabSz="487650" rtl="0" eaLnBrk="1" latinLnBrk="0" hangingPunct="1">
+      <a:lvl9pPr marL="1761226" indent="-103602" algn="l" defTabSz="414406" rtl="0" eaLnBrk="1" latinLnBrk="0" hangingPunct="1">
         <a:lnSpc>
           <a:spcPct val="90000"/>
         </a:lnSpc>
         <a:spcBef>
-          <a:spcPts val="267"/>
+          <a:spcPts val="227"/>
         </a:spcBef>
         <a:buFont typeface="Arial" panose="020B0604020202020204" pitchFamily="34" charset="0"/>
         <a:buChar char="•"/>
-        <a:defRPr sz="960" kern="1200">
+        <a:defRPr sz="816" kern="1200">
           <a:solidFill>
             <a:schemeClr val="tx1"/>
           </a:solidFill>
@@ -3517,8 +3522,8 @@
       <a:defPPr>
         <a:defRPr lang="en-US"/>
       </a:defPPr>
-      <a:lvl1pPr marL="0" algn="l" defTabSz="487650" rtl="0" eaLnBrk="1" latinLnBrk="0" hangingPunct="1">
-        <a:defRPr sz="960" kern="1200">
+      <a:lvl1pPr marL="0" algn="l" defTabSz="414406" rtl="0" eaLnBrk="1" latinLnBrk="0" hangingPunct="1">
+        <a:defRPr sz="816" kern="1200">
           <a:solidFill>
             <a:schemeClr val="tx1"/>
           </a:solidFill>
@@ -3527,8 +3532,8 @@
           <a:cs typeface="+mn-cs"/>
         </a:defRPr>
       </a:lvl1pPr>
-      <a:lvl2pPr marL="243825" algn="l" defTabSz="487650" rtl="0" eaLnBrk="1" latinLnBrk="0" hangingPunct="1">
-        <a:defRPr sz="960" kern="1200">
+      <a:lvl2pPr marL="207203" algn="l" defTabSz="414406" rtl="0" eaLnBrk="1" latinLnBrk="0" hangingPunct="1">
+        <a:defRPr sz="816" kern="1200">
           <a:solidFill>
             <a:schemeClr val="tx1"/>
           </a:solidFill>
@@ -3537,8 +3542,8 @@
           <a:cs typeface="+mn-cs"/>
         </a:defRPr>
       </a:lvl2pPr>
-      <a:lvl3pPr marL="487650" algn="l" defTabSz="487650" rtl="0" eaLnBrk="1" latinLnBrk="0" hangingPunct="1">
-        <a:defRPr sz="960" kern="1200">
+      <a:lvl3pPr marL="414406" algn="l" defTabSz="414406" rtl="0" eaLnBrk="1" latinLnBrk="0" hangingPunct="1">
+        <a:defRPr sz="816" kern="1200">
           <a:solidFill>
             <a:schemeClr val="tx1"/>
           </a:solidFill>
@@ -3547,8 +3552,8 @@
           <a:cs typeface="+mn-cs"/>
         </a:defRPr>
       </a:lvl3pPr>
-      <a:lvl4pPr marL="731474" algn="l" defTabSz="487650" rtl="0" eaLnBrk="1" latinLnBrk="0" hangingPunct="1">
-        <a:defRPr sz="960" kern="1200">
+      <a:lvl4pPr marL="621609" algn="l" defTabSz="414406" rtl="0" eaLnBrk="1" latinLnBrk="0" hangingPunct="1">
+        <a:defRPr sz="816" kern="1200">
           <a:solidFill>
             <a:schemeClr val="tx1"/>
           </a:solidFill>
@@ -3557,8 +3562,8 @@
           <a:cs typeface="+mn-cs"/>
         </a:defRPr>
       </a:lvl4pPr>
-      <a:lvl5pPr marL="975299" algn="l" defTabSz="487650" rtl="0" eaLnBrk="1" latinLnBrk="0" hangingPunct="1">
-        <a:defRPr sz="960" kern="1200">
+      <a:lvl5pPr marL="828812" algn="l" defTabSz="414406" rtl="0" eaLnBrk="1" latinLnBrk="0" hangingPunct="1">
+        <a:defRPr sz="816" kern="1200">
           <a:solidFill>
             <a:schemeClr val="tx1"/>
           </a:solidFill>
@@ -3567,8 +3572,8 @@
           <a:cs typeface="+mn-cs"/>
         </a:defRPr>
       </a:lvl5pPr>
-      <a:lvl6pPr marL="1219124" algn="l" defTabSz="487650" rtl="0" eaLnBrk="1" latinLnBrk="0" hangingPunct="1">
-        <a:defRPr sz="960" kern="1200">
+      <a:lvl6pPr marL="1036015" algn="l" defTabSz="414406" rtl="0" eaLnBrk="1" latinLnBrk="0" hangingPunct="1">
+        <a:defRPr sz="816" kern="1200">
           <a:solidFill>
             <a:schemeClr val="tx1"/>
           </a:solidFill>
@@ -3577,8 +3582,8 @@
           <a:cs typeface="+mn-cs"/>
         </a:defRPr>
       </a:lvl6pPr>
-      <a:lvl7pPr marL="1462949" algn="l" defTabSz="487650" rtl="0" eaLnBrk="1" latinLnBrk="0" hangingPunct="1">
-        <a:defRPr sz="960" kern="1200">
+      <a:lvl7pPr marL="1243218" algn="l" defTabSz="414406" rtl="0" eaLnBrk="1" latinLnBrk="0" hangingPunct="1">
+        <a:defRPr sz="816" kern="1200">
           <a:solidFill>
             <a:schemeClr val="tx1"/>
           </a:solidFill>
@@ -3587,8 +3592,8 @@
           <a:cs typeface="+mn-cs"/>
         </a:defRPr>
       </a:lvl7pPr>
-      <a:lvl8pPr marL="1706773" algn="l" defTabSz="487650" rtl="0" eaLnBrk="1" latinLnBrk="0" hangingPunct="1">
-        <a:defRPr sz="960" kern="1200">
+      <a:lvl8pPr marL="1450421" algn="l" defTabSz="414406" rtl="0" eaLnBrk="1" latinLnBrk="0" hangingPunct="1">
+        <a:defRPr sz="816" kern="1200">
           <a:solidFill>
             <a:schemeClr val="tx1"/>
           </a:solidFill>
@@ -3597,8 +3602,8 @@
           <a:cs typeface="+mn-cs"/>
         </a:defRPr>
       </a:lvl8pPr>
-      <a:lvl9pPr marL="1950598" algn="l" defTabSz="487650" rtl="0" eaLnBrk="1" latinLnBrk="0" hangingPunct="1">
-        <a:defRPr sz="960" kern="1200">
+      <a:lvl9pPr marL="1657624" algn="l" defTabSz="414406" rtl="0" eaLnBrk="1" latinLnBrk="0" hangingPunct="1">
+        <a:defRPr sz="816" kern="1200">
           <a:solidFill>
             <a:schemeClr val="tx1"/>
           </a:solidFill>
@@ -3639,8 +3644,8 @@
         </p:nvCxnSpPr>
         <p:spPr>
           <a:xfrm>
-            <a:off x="1503177" y="1754391"/>
-            <a:ext cx="4841303" cy="0"/>
+            <a:off x="959062" y="1473132"/>
+            <a:ext cx="5272069" cy="0"/>
           </a:xfrm>
           <a:prstGeom prst="straightConnector1">
             <a:avLst/>
@@ -3684,8 +3689,8 @@
         </p:nvCxnSpPr>
         <p:spPr>
           <a:xfrm>
-            <a:off x="5493983" y="1486772"/>
-            <a:ext cx="0" cy="495000"/>
+            <a:off x="5304954" y="1181702"/>
+            <a:ext cx="0" cy="539044"/>
           </a:xfrm>
           <a:prstGeom prst="straightConnector1">
             <a:avLst/>
@@ -3716,8 +3721,8 @@
         </p:nvCxnSpPr>
         <p:spPr>
           <a:xfrm>
-            <a:off x="6341746" y="1506891"/>
-            <a:ext cx="0" cy="495000"/>
+            <a:off x="6228148" y="1203612"/>
+            <a:ext cx="0" cy="539044"/>
           </a:xfrm>
           <a:prstGeom prst="straightConnector1">
             <a:avLst/>
@@ -3748,8 +3753,8 @@
         </p:nvGrpSpPr>
         <p:grpSpPr>
           <a:xfrm>
-            <a:off x="3383642" y="1090909"/>
-            <a:ext cx="575240" cy="379130"/>
+            <a:off x="3006844" y="750618"/>
+            <a:ext cx="626423" cy="412863"/>
             <a:chOff x="1249464" y="2409098"/>
             <a:chExt cx="741504" cy="490016"/>
           </a:xfrm>
@@ -3791,13 +3796,13 @@
             </a:ln>
           </p:spPr>
           <p:txBody>
-            <a:bodyPr spcFirstLastPara="1" wrap="square" lIns="85717" tIns="42845" rIns="85717" bIns="42845" anchor="ctr" anchorCtr="0">
+            <a:bodyPr spcFirstLastPara="1" wrap="square" lIns="93344" tIns="46657" rIns="93344" bIns="46657" anchor="ctr" anchorCtr="0">
               <a:noAutofit/>
             </a:bodyPr>
             <a:lstStyle/>
             <a:p>
               <a:pPr algn="ctr"/>
-              <a:endParaRPr sz="1751" dirty="0">
+              <a:endParaRPr sz="1907" dirty="0">
                 <a:solidFill>
                   <a:schemeClr val="lt1"/>
                 </a:solidFill>
@@ -3835,13 +3840,13 @@
             </a:ln>
           </p:spPr>
           <p:txBody>
-            <a:bodyPr spcFirstLastPara="1" wrap="square" lIns="85717" tIns="42845" rIns="85717" bIns="42845" anchor="t" anchorCtr="0">
+            <a:bodyPr spcFirstLastPara="1" wrap="square" lIns="93344" tIns="46657" rIns="93344" bIns="46657" anchor="t" anchorCtr="0">
               <a:noAutofit/>
             </a:bodyPr>
             <a:lstStyle/>
             <a:p>
               <a:r>
-                <a:rPr lang="en-US" sz="1043" dirty="0">
+                <a:rPr lang="en-US" sz="1135" dirty="0">
                   <a:solidFill>
                     <a:schemeClr val="bg1"/>
                   </a:solidFill>
@@ -3869,8 +3874,8 @@
         </p:nvGrpSpPr>
         <p:grpSpPr>
           <a:xfrm>
-            <a:off x="2603798" y="1279511"/>
-            <a:ext cx="575240" cy="282712"/>
+            <a:off x="2157610" y="956001"/>
+            <a:ext cx="626423" cy="307867"/>
             <a:chOff x="1250078" y="2409098"/>
             <a:chExt cx="741504" cy="490016"/>
           </a:xfrm>
@@ -3912,13 +3917,13 @@
             </a:ln>
           </p:spPr>
           <p:txBody>
-            <a:bodyPr spcFirstLastPara="1" wrap="square" lIns="85717" tIns="42845" rIns="85717" bIns="42845" anchor="ctr" anchorCtr="0">
+            <a:bodyPr spcFirstLastPara="1" wrap="square" lIns="93344" tIns="46657" rIns="93344" bIns="46657" anchor="ctr" anchorCtr="0">
               <a:noAutofit/>
             </a:bodyPr>
             <a:lstStyle/>
             <a:p>
               <a:pPr algn="ctr"/>
-              <a:endParaRPr sz="1751" dirty="0">
+              <a:endParaRPr sz="1907" dirty="0">
                 <a:solidFill>
                   <a:schemeClr val="lt1"/>
                 </a:solidFill>
@@ -3956,13 +3961,13 @@
             </a:ln>
           </p:spPr>
           <p:txBody>
-            <a:bodyPr spcFirstLastPara="1" wrap="square" lIns="85717" tIns="42845" rIns="85717" bIns="42845" anchor="t" anchorCtr="0">
+            <a:bodyPr spcFirstLastPara="1" wrap="square" lIns="93344" tIns="46657" rIns="93344" bIns="46657" anchor="t" anchorCtr="0">
               <a:noAutofit/>
             </a:bodyPr>
             <a:lstStyle/>
             <a:p>
               <a:r>
-                <a:rPr lang="en-US" sz="1043" dirty="0">
+                <a:rPr lang="en-US" sz="1135" dirty="0">
                   <a:solidFill>
                     <a:schemeClr val="bg1"/>
                   </a:solidFill>
@@ -3990,8 +3995,8 @@
         </p:nvSpPr>
         <p:spPr>
           <a:xfrm rot="10800000" flipH="1">
-            <a:off x="1796333" y="2279057"/>
-            <a:ext cx="217528" cy="263735"/>
+            <a:off x="1285628" y="1987939"/>
+            <a:ext cx="230137" cy="203854"/>
           </a:xfrm>
           <a:prstGeom prst="downArrow">
             <a:avLst>
@@ -4013,13 +4018,13 @@
           </a:ln>
         </p:spPr>
         <p:txBody>
-          <a:bodyPr spcFirstLastPara="1" wrap="square" lIns="85717" tIns="42845" rIns="85717" bIns="42845" anchor="ctr" anchorCtr="0">
+          <a:bodyPr spcFirstLastPara="1" wrap="square" lIns="93344" tIns="46657" rIns="93344" bIns="46657" anchor="ctr" anchorCtr="0">
             <a:noAutofit/>
           </a:bodyPr>
           <a:lstStyle/>
           <a:p>
             <a:pPr algn="ctr"/>
-            <a:endParaRPr sz="1752">
+            <a:endParaRPr sz="1908" dirty="0">
               <a:solidFill>
                 <a:schemeClr val="lt1"/>
               </a:solidFill>
@@ -4045,8 +4050,8 @@
         </p:nvSpPr>
         <p:spPr>
           <a:xfrm flipH="1">
-            <a:off x="6242940" y="1162943"/>
-            <a:ext cx="186023" cy="296148"/>
+            <a:off x="6120555" y="829061"/>
+            <a:ext cx="202575" cy="322499"/>
           </a:xfrm>
           <a:prstGeom prst="downArrow">
             <a:avLst>
@@ -4068,13 +4073,13 @@
           </a:ln>
         </p:spPr>
         <p:txBody>
-          <a:bodyPr spcFirstLastPara="1" wrap="square" lIns="85717" tIns="42845" rIns="85717" bIns="42845" anchor="ctr" anchorCtr="0">
+          <a:bodyPr spcFirstLastPara="1" wrap="square" lIns="93344" tIns="46657" rIns="93344" bIns="46657" anchor="ctr" anchorCtr="0">
             <a:noAutofit/>
           </a:bodyPr>
           <a:lstStyle/>
           <a:p>
             <a:pPr algn="ctr"/>
-            <a:endParaRPr sz="1751">
+            <a:endParaRPr sz="1907">
               <a:latin typeface="Calibri"/>
               <a:ea typeface="Calibri"/>
               <a:cs typeface="Calibri"/>
@@ -4097,10 +4102,10 @@
         </p:nvGrpSpPr>
         <p:grpSpPr>
           <a:xfrm>
-            <a:off x="448339" y="274999"/>
-            <a:ext cx="7910874" cy="3205433"/>
-            <a:chOff x="-1566055" y="211145"/>
-            <a:chExt cx="7910874" cy="3205433"/>
+            <a:off x="3836" y="11866"/>
+            <a:ext cx="8272282" cy="3426539"/>
+            <a:chOff x="-1388391" y="348664"/>
+            <a:chExt cx="7596377" cy="3146566"/>
           </a:xfrm>
         </p:grpSpPr>
         <p:sp>
@@ -4111,7 +4116,7 @@
           </p:nvSpPr>
           <p:spPr>
             <a:xfrm>
-              <a:off x="1301476" y="2177273"/>
+              <a:off x="1164643" y="2255925"/>
               <a:ext cx="5043343" cy="1239305"/>
             </a:xfrm>
             <a:prstGeom prst="rect">
@@ -4123,13 +4128,13 @@
             </a:ln>
           </p:spPr>
           <p:txBody>
-            <a:bodyPr spcFirstLastPara="1" wrap="square" lIns="85717" tIns="42845" rIns="85717" bIns="42845" anchor="t" anchorCtr="0">
+            <a:bodyPr spcFirstLastPara="1" wrap="square" lIns="93344" tIns="46657" rIns="93344" bIns="46657" anchor="t" anchorCtr="0">
               <a:noAutofit/>
             </a:bodyPr>
             <a:lstStyle/>
             <a:p>
               <a:r>
-                <a:rPr lang="en-US" sz="1312" dirty="0">
+                <a:rPr lang="en-US" sz="1428" dirty="0">
                   <a:solidFill>
                     <a:srgbClr val="238B45"/>
                   </a:solidFill>
@@ -4142,7 +4147,7 @@
             </a:p>
             <a:p>
               <a:r>
-                <a:rPr lang="en-US" sz="1312" dirty="0">
+                <a:rPr lang="en-US" sz="1428" dirty="0">
                   <a:solidFill>
                     <a:srgbClr val="88419D"/>
                   </a:solidFill>
@@ -4153,7 +4158,7 @@
                 <a:t>1-day of 15% PEG 3350 in drinking water (N = 18)</a:t>
               </a:r>
               <a:r>
-                <a:rPr lang="en-US" sz="1312" dirty="0">
+                <a:rPr lang="en-US" sz="1428" dirty="0">
                   <a:solidFill>
                     <a:schemeClr val="dk1"/>
                   </a:solidFill>
@@ -4166,7 +4171,7 @@
             </a:p>
             <a:p>
               <a:r>
-                <a:rPr lang="en-US" sz="1312" dirty="0">
+                <a:rPr lang="en-US" sz="1428" dirty="0">
                   <a:solidFill>
                     <a:srgbClr val="F768A1"/>
                   </a:solidFill>
@@ -4179,7 +4184,7 @@
             </a:p>
             <a:p>
               <a:r>
-                <a:rPr lang="en-US" sz="1312" dirty="0">
+                <a:rPr lang="en-US" sz="1428" dirty="0">
                   <a:solidFill>
                     <a:srgbClr val="225EA8"/>
                   </a:solidFill>
@@ -4191,7 +4196,7 @@
               </a:r>
             </a:p>
             <a:p>
-              <a:endParaRPr lang="en-US" sz="1875" dirty="0">
+              <a:endParaRPr lang="en-US" sz="2042" dirty="0">
                 <a:solidFill>
                   <a:srgbClr val="225EA8"/>
                 </a:solidFill>
@@ -4201,11 +4206,11 @@
               </a:endParaRPr>
             </a:p>
             <a:p>
-              <a:pPr marL="321444" indent="-321444">
+              <a:pPr marL="350051" indent="-350051">
                 <a:buFont typeface="Arial" panose="020B0604020202020204" pitchFamily="34" charset="0"/>
                 <a:buChar char="•"/>
               </a:pPr>
-              <a:endParaRPr lang="en-US" sz="1875" dirty="0">
+              <a:endParaRPr lang="en-US" sz="2042" dirty="0">
                 <a:solidFill>
                   <a:schemeClr val="dk1"/>
                 </a:solidFill>
@@ -4215,11 +4220,11 @@
               </a:endParaRPr>
             </a:p>
             <a:p>
-              <a:pPr marL="321444" indent="-321444">
+              <a:pPr marL="350051" indent="-350051">
                 <a:buFont typeface="Arial" panose="020B0604020202020204" pitchFamily="34" charset="0"/>
                 <a:buChar char="•"/>
               </a:pPr>
-              <a:endParaRPr lang="en-US" sz="1875" dirty="0">
+              <a:endParaRPr lang="en-US" sz="2042" dirty="0">
                 <a:ea typeface="Calibri"/>
                 <a:cs typeface="Calibri"/>
                 <a:sym typeface="Calibri"/>
@@ -4227,7 +4232,7 @@
             </a:p>
             <a:p>
               <a:r>
-                <a:rPr lang="en-US" sz="1875" dirty="0">
+                <a:rPr lang="en-US" sz="2042" dirty="0">
                   <a:solidFill>
                     <a:schemeClr val="dk1"/>
                   </a:solidFill>
@@ -4248,8 +4253,8 @@
           </p:nvSpPr>
           <p:spPr>
             <a:xfrm>
-              <a:off x="-429920" y="2806739"/>
-              <a:ext cx="1571625" cy="490500"/>
+              <a:off x="-93918" y="2435739"/>
+              <a:ext cx="1275158" cy="490500"/>
             </a:xfrm>
             <a:prstGeom prst="rect">
               <a:avLst/>
@@ -4260,14 +4265,14 @@
             </a:ln>
           </p:spPr>
           <p:txBody>
-            <a:bodyPr spcFirstLastPara="1" wrap="square" lIns="85717" tIns="42845" rIns="85717" bIns="42845" anchor="t" anchorCtr="0">
+            <a:bodyPr spcFirstLastPara="1" wrap="square" lIns="93344" tIns="46657" rIns="93344" bIns="46657" anchor="t" anchorCtr="0">
               <a:noAutofit/>
             </a:bodyPr>
             <a:lstStyle/>
             <a:p>
               <a:pPr algn="ctr"/>
               <a:r>
-                <a:rPr lang="en" sz="1375" dirty="0">
+                <a:rPr lang="en" sz="1497" dirty="0">
                   <a:latin typeface="Calibri"/>
                   <a:ea typeface="Calibri"/>
                   <a:cs typeface="Calibri"/>
@@ -4276,7 +4281,7 @@
                 <a:t>Gavage 10</a:t>
               </a:r>
               <a:r>
-                <a:rPr lang="en" sz="1375" baseline="30000" dirty="0">
+                <a:rPr lang="en" sz="1497" baseline="30000" dirty="0">
                   <a:latin typeface="Calibri"/>
                   <a:ea typeface="Calibri"/>
                   <a:cs typeface="Calibri"/>
@@ -4285,7 +4290,7 @@
                 <a:t>3-5</a:t>
               </a:r>
               <a:r>
-                <a:rPr lang="en" sz="1375" dirty="0">
+                <a:rPr lang="en" sz="1497" dirty="0">
                   <a:latin typeface="Calibri"/>
                   <a:ea typeface="Calibri"/>
                   <a:cs typeface="Calibri"/>
@@ -4294,7 +4299,7 @@
                 <a:t> spores </a:t>
               </a:r>
               <a:r>
-                <a:rPr lang="en" sz="1375" i="1" dirty="0">
+                <a:rPr lang="en" sz="1497" i="1" dirty="0">
                   <a:latin typeface="Calibri"/>
                   <a:ea typeface="Calibri"/>
                   <a:cs typeface="Calibri"/>
@@ -4303,7 +4308,7 @@
                 <a:t>C. difficile </a:t>
               </a:r>
               <a:r>
-                <a:rPr lang="en" sz="1375" dirty="0">
+                <a:rPr lang="en" sz="1497" dirty="0">
                   <a:latin typeface="Calibri"/>
                   <a:ea typeface="Calibri"/>
                   <a:cs typeface="Calibri"/>
@@ -4311,7 +4316,7 @@
                 </a:rPr>
                 <a:t>630</a:t>
               </a:r>
-              <a:endParaRPr sz="1375" dirty="0"/>
+              <a:endParaRPr sz="1497" dirty="0"/>
             </a:p>
           </p:txBody>
         </p:sp>
@@ -4419,113 +4424,6 @@
             </a:ln>
           </p:spPr>
         </p:cxnSp>
-        <p:sp>
-          <p:nvSpPr>
-            <p:cNvPr id="699" name="Google Shape;699;p64"/>
-            <p:cNvSpPr/>
-            <p:nvPr/>
-          </p:nvSpPr>
-          <p:spPr>
-            <a:xfrm>
-              <a:off x="508849" y="2387953"/>
-              <a:ext cx="734428" cy="346125"/>
-            </a:xfrm>
-            <a:prstGeom prst="rect">
-              <a:avLst/>
-            </a:prstGeom>
-            <a:noFill/>
-            <a:ln>
-              <a:noFill/>
-            </a:ln>
-          </p:spPr>
-          <p:txBody>
-            <a:bodyPr spcFirstLastPara="1" wrap="square" lIns="85717" tIns="42845" rIns="85717" bIns="42845" anchor="t" anchorCtr="0">
-              <a:noAutofit/>
-            </a:bodyPr>
-            <a:lstStyle/>
-            <a:p>
-              <a:pPr algn="ctr"/>
-              <a:r>
-                <a:rPr lang="en" sz="1125" dirty="0" err="1">
-                  <a:latin typeface="Calibri"/>
-                  <a:ea typeface="Calibri"/>
-                  <a:cs typeface="Calibri"/>
-                  <a:sym typeface="Calibri"/>
-                </a:rPr>
-                <a:t>Clind</a:t>
-              </a:r>
-              <a:r>
-                <a:rPr lang="en" sz="1125" dirty="0">
-                  <a:latin typeface="Calibri"/>
-                  <a:ea typeface="Calibri"/>
-                  <a:cs typeface="Calibri"/>
-                  <a:sym typeface="Calibri"/>
-                </a:rPr>
-                <a:t>. + </a:t>
-              </a:r>
-              <a:r>
-                <a:rPr lang="en" sz="1125" i="1" dirty="0">
-                  <a:latin typeface="Calibri"/>
-                  <a:ea typeface="Calibri"/>
-                  <a:cs typeface="Calibri"/>
-                  <a:sym typeface="Calibri"/>
-                </a:rPr>
-                <a:t>C. difficile </a:t>
-              </a:r>
-              <a:endParaRPr sz="1125" dirty="0">
-                <a:latin typeface="Calibri"/>
-                <a:ea typeface="Calibri"/>
-                <a:cs typeface="Calibri"/>
-                <a:sym typeface="Calibri"/>
-              </a:endParaRPr>
-            </a:p>
-          </p:txBody>
-        </p:sp>
-        <p:sp>
-          <p:nvSpPr>
-            <p:cNvPr id="3" name="Right Brace 2">
-              <a:extLst>
-                <a:ext uri="{FF2B5EF4-FFF2-40B4-BE49-F238E27FC236}">
-                  <a16:creationId xmlns:a16="http://schemas.microsoft.com/office/drawing/2014/main" id="{BAD1F18A-B6AD-7D40-975A-F7A43DCEC06A}"/>
-                </a:ext>
-              </a:extLst>
-            </p:cNvPr>
-            <p:cNvSpPr/>
-            <p:nvPr/>
-          </p:nvSpPr>
-          <p:spPr>
-            <a:xfrm rot="10800000">
-              <a:off x="1206809" y="2215904"/>
-              <a:ext cx="136908" cy="765405"/>
-            </a:xfrm>
-            <a:prstGeom prst="rightBrace">
-              <a:avLst/>
-            </a:prstGeom>
-            <a:ln w="28575"/>
-          </p:spPr>
-          <p:style>
-            <a:lnRef idx="1">
-              <a:schemeClr val="dk1"/>
-            </a:lnRef>
-            <a:fillRef idx="0">
-              <a:schemeClr val="dk1"/>
-            </a:fillRef>
-            <a:effectRef idx="0">
-              <a:schemeClr val="dk1"/>
-            </a:effectRef>
-            <a:fontRef idx="minor">
-              <a:schemeClr val="tx1"/>
-            </a:fontRef>
-          </p:style>
-          <p:txBody>
-            <a:bodyPr rtlCol="0" anchor="ctr"/>
-            <a:lstStyle/>
-            <a:p>
-              <a:pPr algn="ctr"/>
-              <a:endParaRPr lang="en-US" sz="1043"/>
-            </a:p>
-          </p:txBody>
-        </p:sp>
         <p:cxnSp>
           <p:nvCxnSpPr>
             <p:cNvPr id="51" name="Google Shape;681;p64">
@@ -4604,7 +4502,7 @@
           </p:nvSpPr>
           <p:spPr>
             <a:xfrm>
-              <a:off x="-803370" y="2416659"/>
+              <a:off x="-778480" y="2286600"/>
               <a:ext cx="1369125" cy="490500"/>
             </a:xfrm>
             <a:prstGeom prst="rect">
@@ -4616,14 +4514,14 @@
             </a:ln>
           </p:spPr>
           <p:txBody>
-            <a:bodyPr spcFirstLastPara="1" wrap="square" lIns="85717" tIns="42845" rIns="85717" bIns="42845" anchor="t" anchorCtr="0">
+            <a:bodyPr spcFirstLastPara="1" wrap="square" lIns="93344" tIns="46657" rIns="93344" bIns="46657" anchor="t" anchorCtr="0">
               <a:noAutofit/>
             </a:bodyPr>
             <a:lstStyle/>
             <a:p>
               <a:pPr algn="ctr"/>
               <a:r>
-                <a:rPr lang="en" sz="1375" dirty="0" err="1">
+                <a:rPr lang="en" sz="1497" dirty="0" err="1">
                   <a:latin typeface="Calibri"/>
                   <a:ea typeface="Calibri"/>
                   <a:cs typeface="Calibri"/>
@@ -4632,7 +4530,7 @@
                 <a:t>Clind</a:t>
               </a:r>
               <a:r>
-                <a:rPr lang="en" sz="1375" dirty="0">
+                <a:rPr lang="en" sz="1497" dirty="0">
                   <a:latin typeface="Calibri"/>
                   <a:ea typeface="Calibri"/>
                   <a:cs typeface="Calibri"/>
@@ -4640,12 +4538,12 @@
                 </a:rPr>
                 <a:t>.</a:t>
               </a:r>
-              <a:endParaRPr sz="1375" dirty="0"/>
+              <a:endParaRPr sz="1497" dirty="0"/>
             </a:p>
             <a:p>
               <a:pPr algn="ctr"/>
               <a:r>
-                <a:rPr lang="en" sz="1375" dirty="0">
+                <a:rPr lang="en" sz="1497" dirty="0">
                   <a:latin typeface="Calibri"/>
                   <a:ea typeface="Calibri"/>
                   <a:cs typeface="Calibri"/>
@@ -4653,7 +4551,7 @@
                 </a:rPr>
                 <a:t>IP</a:t>
               </a:r>
-              <a:endParaRPr sz="1375" dirty="0"/>
+              <a:endParaRPr sz="1497" dirty="0"/>
             </a:p>
           </p:txBody>
         </p:sp>
@@ -4694,13 +4592,13 @@
             </a:ln>
           </p:spPr>
           <p:txBody>
-            <a:bodyPr spcFirstLastPara="1" wrap="square" lIns="85717" tIns="42845" rIns="85717" bIns="42845" anchor="ctr" anchorCtr="0">
+            <a:bodyPr spcFirstLastPara="1" wrap="square" lIns="93344" tIns="46657" rIns="93344" bIns="46657" anchor="ctr" anchorCtr="0">
               <a:noAutofit/>
             </a:bodyPr>
             <a:lstStyle/>
             <a:p>
               <a:pPr algn="ctr"/>
-              <a:endParaRPr sz="1751" dirty="0">
+              <a:endParaRPr sz="1907" dirty="0">
                 <a:latin typeface="Calibri"/>
                 <a:ea typeface="Calibri"/>
                 <a:cs typeface="Calibri"/>
@@ -4735,14 +4633,14 @@
             </a:ln>
           </p:spPr>
           <p:txBody>
-            <a:bodyPr spcFirstLastPara="1" wrap="square" lIns="85717" tIns="42845" rIns="85717" bIns="42845" anchor="t" anchorCtr="0">
+            <a:bodyPr spcFirstLastPara="1" wrap="square" lIns="93344" tIns="46657" rIns="93344" bIns="46657" anchor="t" anchorCtr="0">
               <a:noAutofit/>
             </a:bodyPr>
             <a:lstStyle/>
             <a:p>
               <a:pPr algn="ctr"/>
               <a:r>
-                <a:rPr lang="en" sz="1500" dirty="0">
+                <a:rPr lang="en" sz="1633" dirty="0">
                   <a:solidFill>
                     <a:schemeClr val="dk1"/>
                   </a:solidFill>
@@ -4753,7 +4651,7 @@
                 </a:rPr>
                 <a:t>Euthanize</a:t>
               </a:r>
-              <a:endParaRPr sz="1375" dirty="0"/>
+              <a:endParaRPr sz="1497" dirty="0"/>
             </a:p>
           </p:txBody>
         </p:sp>
@@ -4771,8 +4669,8 @@
           </p:nvSpPr>
           <p:spPr>
             <a:xfrm>
-              <a:off x="1745431" y="781709"/>
-              <a:ext cx="201203" cy="339084"/>
+              <a:off x="1745431" y="891240"/>
+              <a:ext cx="204786" cy="229553"/>
             </a:xfrm>
             <a:prstGeom prst="downArrow">
               <a:avLst>
@@ -4798,13 +4696,13 @@
             </a:ln>
           </p:spPr>
           <p:txBody>
-            <a:bodyPr spcFirstLastPara="1" wrap="square" lIns="85717" tIns="42845" rIns="85717" bIns="42845" anchor="ctr" anchorCtr="0">
+            <a:bodyPr spcFirstLastPara="1" wrap="square" lIns="93344" tIns="46657" rIns="93344" bIns="46657" anchor="ctr" anchorCtr="0">
               <a:noAutofit/>
             </a:bodyPr>
             <a:lstStyle/>
             <a:p>
               <a:pPr algn="ctr"/>
-              <a:endParaRPr sz="1751">
+              <a:endParaRPr sz="1907" dirty="0">
                 <a:solidFill>
                   <a:schemeClr val="bg2">
                     <a:lumMod val="75000"/>
@@ -4832,7 +4730,7 @@
           </p:nvSpPr>
           <p:spPr>
             <a:xfrm rot="3588411">
-              <a:off x="1580800" y="616766"/>
+              <a:off x="1528130" y="748104"/>
               <a:ext cx="257476" cy="64879"/>
             </a:xfrm>
             <a:prstGeom prst="roundRect">
@@ -4854,13 +4752,13 @@
             </a:ln>
           </p:spPr>
           <p:txBody>
-            <a:bodyPr spcFirstLastPara="1" wrap="square" lIns="85717" tIns="42845" rIns="85717" bIns="42845" anchor="ctr" anchorCtr="0">
+            <a:bodyPr spcFirstLastPara="1" wrap="square" lIns="93344" tIns="46657" rIns="93344" bIns="46657" anchor="ctr" anchorCtr="0">
               <a:noAutofit/>
             </a:bodyPr>
             <a:lstStyle/>
             <a:p>
               <a:pPr algn="ctr"/>
-              <a:endParaRPr sz="1751" dirty="0">
+              <a:endParaRPr sz="1907" dirty="0">
                 <a:solidFill>
                   <a:schemeClr val="accent2">
                     <a:lumMod val="50000"/>
@@ -4931,13 +4829,13 @@
               </a:ln>
             </p:spPr>
             <p:txBody>
-              <a:bodyPr spcFirstLastPara="1" wrap="square" lIns="85717" tIns="42845" rIns="85717" bIns="42845" anchor="ctr" anchorCtr="0">
+              <a:bodyPr spcFirstLastPara="1" wrap="square" lIns="93344" tIns="46657" rIns="93344" bIns="46657" anchor="ctr" anchorCtr="0">
                 <a:noAutofit/>
               </a:bodyPr>
               <a:lstStyle/>
               <a:p>
                 <a:pPr algn="ctr"/>
-                <a:endParaRPr sz="1751" dirty="0">
+                <a:endParaRPr sz="1907" dirty="0">
                   <a:solidFill>
                     <a:schemeClr val="lt1"/>
                   </a:solidFill>
@@ -4975,13 +4873,13 @@
               </a:ln>
             </p:spPr>
             <p:txBody>
-              <a:bodyPr spcFirstLastPara="1" wrap="square" lIns="85717" tIns="42845" rIns="85717" bIns="42845" anchor="t" anchorCtr="0">
+              <a:bodyPr spcFirstLastPara="1" wrap="square" lIns="93344" tIns="46657" rIns="93344" bIns="46657" anchor="t" anchorCtr="0">
                 <a:noAutofit/>
               </a:bodyPr>
               <a:lstStyle/>
               <a:p>
                 <a:r>
-                  <a:rPr lang="en-US" sz="1043" dirty="0">
+                  <a:rPr lang="en-US" sz="1135" dirty="0">
                     <a:solidFill>
                       <a:schemeClr val="bg1"/>
                     </a:solidFill>
@@ -5009,7 +4907,7 @@
           </p:nvSpPr>
           <p:spPr>
             <a:xfrm>
-              <a:off x="933639" y="211145"/>
+              <a:off x="931493" y="348664"/>
               <a:ext cx="1845635" cy="371790"/>
             </a:xfrm>
             <a:prstGeom prst="rect">
@@ -5021,14 +4919,14 @@
             </a:ln>
           </p:spPr>
           <p:txBody>
-            <a:bodyPr spcFirstLastPara="1" wrap="square" lIns="85717" tIns="42845" rIns="85717" bIns="42845" anchor="t" anchorCtr="0">
+            <a:bodyPr spcFirstLastPara="1" wrap="square" lIns="93344" tIns="46657" rIns="93344" bIns="46657" anchor="t" anchorCtr="0">
               <a:noAutofit/>
             </a:bodyPr>
             <a:lstStyle/>
             <a:p>
               <a:pPr algn="ctr"/>
               <a:r>
-                <a:rPr lang="en" sz="1500" dirty="0">
+                <a:rPr lang="en" sz="1633" dirty="0">
                   <a:solidFill>
                     <a:srgbClr val="F768A1"/>
                   </a:solidFill>
@@ -5040,7 +4938,7 @@
                 <a:t>FMT</a:t>
               </a:r>
               <a:r>
-                <a:rPr lang="en" sz="1500" dirty="0">
+                <a:rPr lang="en" sz="1633" dirty="0">
                   <a:solidFill>
                     <a:schemeClr val="dk1"/>
                   </a:solidFill>
@@ -5052,7 +4950,7 @@
                 <a:t> or </a:t>
               </a:r>
               <a:r>
-                <a:rPr lang="en" sz="1500" dirty="0">
+                <a:rPr lang="en" sz="1633" dirty="0">
                   <a:solidFill>
                     <a:srgbClr val="225EA8"/>
                   </a:solidFill>
@@ -5064,7 +4962,7 @@
                 <a:t>PBS</a:t>
               </a:r>
               <a:r>
-                <a:rPr lang="en" sz="1500" dirty="0">
+                <a:rPr lang="en" sz="1633" dirty="0">
                   <a:solidFill>
                     <a:schemeClr val="dk1"/>
                   </a:solidFill>
@@ -5075,7 +4973,7 @@
                 </a:rPr>
                 <a:t> gavage</a:t>
               </a:r>
-              <a:endParaRPr sz="1375" dirty="0"/>
+              <a:endParaRPr sz="1497" dirty="0"/>
             </a:p>
           </p:txBody>
         </p:sp>
@@ -5093,8 +4991,8 @@
           </p:nvSpPr>
           <p:spPr>
             <a:xfrm rot="10800000">
-              <a:off x="181077" y="2215910"/>
-              <a:ext cx="179800" cy="623457"/>
+              <a:off x="174138" y="2167630"/>
+              <a:ext cx="211332" cy="353361"/>
             </a:xfrm>
             <a:prstGeom prst="downArrow">
               <a:avLst>
@@ -5116,13 +5014,13 @@
             </a:ln>
           </p:spPr>
           <p:txBody>
-            <a:bodyPr spcFirstLastPara="1" wrap="square" lIns="85717" tIns="42845" rIns="85717" bIns="42845" anchor="ctr" anchorCtr="0">
+            <a:bodyPr spcFirstLastPara="1" wrap="square" lIns="93344" tIns="46657" rIns="93344" bIns="46657" anchor="ctr" anchorCtr="0">
               <a:noAutofit/>
             </a:bodyPr>
             <a:lstStyle/>
             <a:p>
               <a:pPr algn="ctr"/>
-              <a:endParaRPr sz="1752">
+              <a:endParaRPr sz="1908" dirty="0">
                 <a:latin typeface="Calibri"/>
                 <a:ea typeface="Calibri"/>
                 <a:cs typeface="Calibri"/>
@@ -5157,13 +5055,13 @@
             </a:ln>
           </p:spPr>
           <p:txBody>
-            <a:bodyPr spcFirstLastPara="1" wrap="square" lIns="85717" tIns="42845" rIns="85717" bIns="42845" anchor="t" anchorCtr="0">
+            <a:bodyPr spcFirstLastPara="1" wrap="square" lIns="93344" tIns="46657" rIns="93344" bIns="46657" anchor="t" anchorCtr="0">
               <a:noAutofit/>
             </a:bodyPr>
             <a:lstStyle/>
             <a:p>
               <a:r>
-                <a:rPr lang="en" sz="2251" dirty="0">
+                <a:rPr lang="en" sz="2451" dirty="0">
                   <a:solidFill>
                     <a:schemeClr val="dk1"/>
                   </a:solidFill>
@@ -5174,7 +5072,7 @@
                 </a:rPr>
                 <a:t>Day:</a:t>
               </a:r>
-              <a:endParaRPr sz="1375" dirty="0"/>
+              <a:endParaRPr sz="1497" dirty="0"/>
             </a:p>
           </p:txBody>
         </p:sp>
@@ -5204,14 +5102,14 @@
             </a:ln>
           </p:spPr>
           <p:txBody>
-            <a:bodyPr spcFirstLastPara="1" wrap="square" lIns="85717" tIns="42845" rIns="85717" bIns="42845" anchor="t" anchorCtr="0">
+            <a:bodyPr spcFirstLastPara="1" wrap="square" lIns="93344" tIns="46657" rIns="93344" bIns="46657" anchor="t" anchorCtr="0">
               <a:noAutofit/>
             </a:bodyPr>
             <a:lstStyle/>
             <a:p>
               <a:pPr algn="ctr"/>
               <a:r>
-                <a:rPr lang="en" sz="1875" dirty="0">
+                <a:rPr lang="en" sz="2042" dirty="0">
                   <a:solidFill>
                     <a:schemeClr val="dk1"/>
                   </a:solidFill>
@@ -5222,7 +5120,7 @@
                 </a:rPr>
                 <a:t>15</a:t>
               </a:r>
-              <a:endParaRPr sz="1375" dirty="0"/>
+              <a:endParaRPr sz="1497" dirty="0"/>
             </a:p>
           </p:txBody>
         </p:sp>
@@ -5252,14 +5150,14 @@
             </a:ln>
           </p:spPr>
           <p:txBody>
-            <a:bodyPr spcFirstLastPara="1" wrap="square" lIns="85717" tIns="42845" rIns="85717" bIns="42845" anchor="t" anchorCtr="0">
+            <a:bodyPr spcFirstLastPara="1" wrap="square" lIns="93344" tIns="46657" rIns="93344" bIns="46657" anchor="t" anchorCtr="0">
               <a:noAutofit/>
             </a:bodyPr>
             <a:lstStyle/>
             <a:p>
               <a:pPr algn="ctr"/>
               <a:r>
-                <a:rPr lang="en" sz="1875" dirty="0">
+                <a:rPr lang="en" sz="2042" dirty="0">
                   <a:solidFill>
                     <a:schemeClr val="dk1"/>
                   </a:solidFill>
@@ -5270,7 +5168,7 @@
                 </a:rPr>
                 <a:t>-2</a:t>
               </a:r>
-              <a:endParaRPr sz="1375" dirty="0"/>
+              <a:endParaRPr sz="1497" dirty="0"/>
             </a:p>
           </p:txBody>
         </p:sp>
@@ -5288,7 +5186,7 @@
           </p:nvSpPr>
           <p:spPr>
             <a:xfrm>
-              <a:off x="-465384" y="1854025"/>
+              <a:off x="-464934" y="1854846"/>
               <a:ext cx="640931" cy="477580"/>
             </a:xfrm>
             <a:prstGeom prst="rect">
@@ -5300,14 +5198,14 @@
             </a:ln>
           </p:spPr>
           <p:txBody>
-            <a:bodyPr spcFirstLastPara="1" wrap="square" lIns="85717" tIns="42845" rIns="85717" bIns="42845" anchor="t" anchorCtr="0">
+            <a:bodyPr spcFirstLastPara="1" wrap="square" lIns="93344" tIns="46657" rIns="93344" bIns="46657" anchor="t" anchorCtr="0">
               <a:noAutofit/>
             </a:bodyPr>
             <a:lstStyle/>
             <a:p>
               <a:pPr algn="ctr"/>
               <a:r>
-                <a:rPr lang="en" sz="1875" dirty="0">
+                <a:rPr lang="en" sz="2042" dirty="0">
                   <a:solidFill>
                     <a:schemeClr val="dk1"/>
                   </a:solidFill>
@@ -5318,7 +5216,7 @@
                 </a:rPr>
                 <a:t>-1</a:t>
               </a:r>
-              <a:endParaRPr sz="1375" dirty="0"/>
+              <a:endParaRPr sz="1497" dirty="0"/>
             </a:p>
           </p:txBody>
         </p:sp>
@@ -5348,14 +5246,14 @@
             </a:ln>
           </p:spPr>
           <p:txBody>
-            <a:bodyPr spcFirstLastPara="1" wrap="square" lIns="85717" tIns="42845" rIns="85717" bIns="42845" anchor="t" anchorCtr="0">
+            <a:bodyPr spcFirstLastPara="1" wrap="square" lIns="93344" tIns="46657" rIns="93344" bIns="46657" anchor="t" anchorCtr="0">
               <a:noAutofit/>
             </a:bodyPr>
             <a:lstStyle/>
             <a:p>
               <a:pPr algn="ctr"/>
               <a:r>
-                <a:rPr lang="en" sz="1875" dirty="0">
+                <a:rPr lang="en" sz="2042" dirty="0">
                   <a:solidFill>
                     <a:schemeClr val="dk1"/>
                   </a:solidFill>
@@ -5368,7 +5266,7 @@
             </a:p>
             <a:p>
               <a:pPr algn="ctr"/>
-              <a:endParaRPr lang="en-US" sz="1375" dirty="0"/>
+              <a:endParaRPr lang="en-US" sz="1497" dirty="0"/>
             </a:p>
           </p:txBody>
         </p:sp>
@@ -5398,14 +5296,14 @@
             </a:ln>
           </p:spPr>
           <p:txBody>
-            <a:bodyPr spcFirstLastPara="1" wrap="square" lIns="85717" tIns="42845" rIns="85717" bIns="42845" anchor="t" anchorCtr="0">
+            <a:bodyPr spcFirstLastPara="1" wrap="square" lIns="93344" tIns="46657" rIns="93344" bIns="46657" anchor="t" anchorCtr="0">
               <a:noAutofit/>
             </a:bodyPr>
             <a:lstStyle/>
             <a:p>
               <a:pPr algn="ctr"/>
               <a:r>
-                <a:rPr lang="en" sz="1875" dirty="0">
+                <a:rPr lang="en" sz="2042" dirty="0">
                   <a:solidFill>
                     <a:schemeClr val="dk1"/>
                   </a:solidFill>
@@ -5416,7 +5314,7 @@
                 </a:rPr>
                 <a:t>4</a:t>
               </a:r>
-              <a:endParaRPr sz="1375" dirty="0"/>
+              <a:endParaRPr sz="1497" dirty="0"/>
             </a:p>
           </p:txBody>
         </p:sp>
@@ -5434,7 +5332,7 @@
           </p:nvSpPr>
           <p:spPr>
             <a:xfrm>
-              <a:off x="4043852" y="1870141"/>
+              <a:off x="4049475" y="1843039"/>
               <a:ext cx="567000" cy="439388"/>
             </a:xfrm>
             <a:prstGeom prst="rect">
@@ -5446,14 +5344,14 @@
             </a:ln>
           </p:spPr>
           <p:txBody>
-            <a:bodyPr spcFirstLastPara="1" wrap="square" lIns="85717" tIns="42845" rIns="85717" bIns="42845" anchor="t" anchorCtr="0">
+            <a:bodyPr spcFirstLastPara="1" wrap="square" lIns="93344" tIns="46657" rIns="93344" bIns="46657" anchor="t" anchorCtr="0">
               <a:noAutofit/>
             </a:bodyPr>
             <a:lstStyle/>
             <a:p>
               <a:pPr algn="ctr"/>
               <a:r>
-                <a:rPr lang="en" sz="1875" dirty="0">
+                <a:rPr lang="en" sz="2042" dirty="0">
                   <a:latin typeface="Calibri"/>
                   <a:cs typeface="Calibri"/>
                   <a:sym typeface="Calibri"/>
@@ -5463,7 +5361,7 @@
             </a:p>
             <a:p>
               <a:pPr algn="ctr"/>
-              <a:endParaRPr sz="1375" dirty="0"/>
+              <a:endParaRPr sz="1497" dirty="0"/>
             </a:p>
           </p:txBody>
         </p:sp>
@@ -5493,14 +5391,14 @@
             </a:ln>
           </p:spPr>
           <p:txBody>
-            <a:bodyPr spcFirstLastPara="1" wrap="square" lIns="85717" tIns="42845" rIns="85717" bIns="42845" anchor="t" anchorCtr="0">
+            <a:bodyPr spcFirstLastPara="1" wrap="square" lIns="93344" tIns="46657" rIns="93344" bIns="46657" anchor="t" anchorCtr="0">
               <a:noAutofit/>
             </a:bodyPr>
             <a:lstStyle/>
             <a:p>
               <a:pPr algn="ctr"/>
               <a:r>
-                <a:rPr lang="en" sz="1875" dirty="0">
+                <a:rPr lang="en" sz="2042" dirty="0">
                   <a:solidFill>
                     <a:schemeClr val="dk1"/>
                   </a:solidFill>
@@ -5513,7 +5411,7 @@
             </a:p>
             <a:p>
               <a:pPr algn="ctr"/>
-              <a:endParaRPr lang="en-US" sz="1375" dirty="0"/>
+              <a:endParaRPr lang="en-US" sz="1497" dirty="0"/>
             </a:p>
           </p:txBody>
         </p:sp>
@@ -5531,7 +5429,7 @@
           </p:nvSpPr>
           <p:spPr>
             <a:xfrm rot="3588411">
-              <a:off x="1820713" y="611292"/>
+              <a:off x="1824723" y="726685"/>
               <a:ext cx="257476" cy="64457"/>
             </a:xfrm>
             <a:prstGeom prst="roundRect">
@@ -5553,13 +5451,13 @@
             </a:ln>
           </p:spPr>
           <p:txBody>
-            <a:bodyPr spcFirstLastPara="1" wrap="square" lIns="85717" tIns="42845" rIns="85717" bIns="42845" anchor="ctr" anchorCtr="0">
+            <a:bodyPr spcFirstLastPara="1" wrap="square" lIns="93344" tIns="46657" rIns="93344" bIns="46657" anchor="ctr" anchorCtr="0">
               <a:noAutofit/>
             </a:bodyPr>
             <a:lstStyle/>
             <a:p>
               <a:pPr algn="ctr"/>
-              <a:endParaRPr sz="1751">
+              <a:endParaRPr sz="1907">
                 <a:solidFill>
                   <a:schemeClr val="accent2">
                     <a:lumMod val="50000"/>
@@ -5599,14 +5497,14 @@
             </a:ln>
           </p:spPr>
           <p:txBody>
-            <a:bodyPr spcFirstLastPara="1" wrap="square" lIns="85717" tIns="42845" rIns="85717" bIns="42845" anchor="t" anchorCtr="0">
+            <a:bodyPr spcFirstLastPara="1" wrap="square" lIns="93344" tIns="46657" rIns="93344" bIns="46657" anchor="t" anchorCtr="0">
               <a:noAutofit/>
             </a:bodyPr>
             <a:lstStyle/>
             <a:p>
               <a:pPr algn="ctr"/>
               <a:r>
-                <a:rPr lang="en" sz="1875" dirty="0">
+                <a:rPr lang="en" sz="2042" dirty="0">
                   <a:solidFill>
                     <a:schemeClr val="dk1"/>
                   </a:solidFill>
@@ -5616,7 +5514,7 @@
                 </a:rPr>
                 <a:t>3</a:t>
               </a:r>
-              <a:endParaRPr sz="1375" dirty="0"/>
+              <a:endParaRPr sz="1497" dirty="0"/>
             </a:p>
           </p:txBody>
         </p:sp>
@@ -5641,7 +5539,7 @@
           </p:blipFill>
           <p:spPr>
             <a:xfrm>
-              <a:off x="-1566055" y="713332"/>
+              <a:off x="-1269781" y="415446"/>
               <a:ext cx="928688" cy="957086"/>
             </a:xfrm>
             <a:prstGeom prst="rect">

</xml_diff>

<commit_message>
Fix post CDI PEG schematic typo
</commit_message>
<xml_diff>
--- a/results/figures/post_CDI_PEG_exp_schematic.pptx
+++ b/results/figures/post_CDI_PEG_exp_schematic.pptx
@@ -115,6 +115,35 @@
 </p:presentation>
 </file>
 
+<file path=ppt/changesInfos/changesInfo1.xml><?xml version="1.0" encoding="utf-8"?>
+<pc:chgInfo xmlns:a="http://schemas.openxmlformats.org/drawingml/2006/main" xmlns:r="http://schemas.openxmlformats.org/officeDocument/2006/relationships" xmlns:ac="http://schemas.microsoft.com/office/drawing/2013/main/command" xmlns:pc="http://schemas.microsoft.com/office/powerpoint/2013/main/command">
+  <pc:docChgLst>
+    <pc:chgData name="Ana Taylor" userId="14c7f9ef16d6513a" providerId="LiveId" clId="{67B3A858-3F00-4828-8DC2-620723065ABC}"/>
+    <pc:docChg chg="modSld">
+      <pc:chgData name="Ana Taylor" userId="14c7f9ef16d6513a" providerId="LiveId" clId="{67B3A858-3F00-4828-8DC2-620723065ABC}" dt="2021-04-10T20:58:46.977" v="5" actId="20577"/>
+      <pc:docMkLst>
+        <pc:docMk/>
+      </pc:docMkLst>
+      <pc:sldChg chg="modSp mod">
+        <pc:chgData name="Ana Taylor" userId="14c7f9ef16d6513a" providerId="LiveId" clId="{67B3A858-3F00-4828-8DC2-620723065ABC}" dt="2021-04-10T20:58:46.977" v="5" actId="20577"/>
+        <pc:sldMkLst>
+          <pc:docMk/>
+          <pc:sldMk cId="3159908065" sldId="533"/>
+        </pc:sldMkLst>
+        <pc:spChg chg="mod">
+          <ac:chgData name="Ana Taylor" userId="14c7f9ef16d6513a" providerId="LiveId" clId="{67B3A858-3F00-4828-8DC2-620723065ABC}" dt="2021-04-10T20:58:46.977" v="5" actId="20577"/>
+          <ac:spMkLst>
+            <pc:docMk/>
+            <pc:sldMk cId="3159908065" sldId="533"/>
+            <ac:spMk id="698" creationId="{00000000-0000-0000-0000-000000000000}"/>
+          </ac:spMkLst>
+        </pc:spChg>
+      </pc:sldChg>
+    </pc:docChg>
+  </pc:docChgLst>
+</pc:chgInfo>
+</file>
+
 <file path=ppt/notesMasters/notesMaster1.xml><?xml version="1.0" encoding="utf-8"?>
 <p:notesMaster xmlns:a="http://schemas.openxmlformats.org/drawingml/2006/main" xmlns:r="http://schemas.openxmlformats.org/officeDocument/2006/relationships" xmlns:p="http://schemas.openxmlformats.org/presentationml/2006/main">
   <p:cSld>
@@ -197,7 +226,7 @@
           <a:p>
             <a:fld id="{A2B1C1CA-69EF-464D-AE40-C4D6E113BFD1}" type="datetimeFigureOut">
               <a:rPr lang="en-US" smtClean="0"/>
-              <a:t>2/23/2021</a:t>
+              <a:t>4/10/2021</a:t>
             </a:fld>
             <a:endParaRPr lang="en-US"/>
           </a:p>
@@ -904,7 +933,7 @@
           <a:p>
             <a:fld id="{9FF62ED1-3F4C-4576-9568-E8EF953AA21A}" type="datetimeFigureOut">
               <a:rPr lang="en-US" smtClean="0"/>
-              <a:t>2/23/2021</a:t>
+              <a:t>4/10/2021</a:t>
             </a:fld>
             <a:endParaRPr lang="en-US"/>
           </a:p>
@@ -1074,7 +1103,7 @@
           <a:p>
             <a:fld id="{9FF62ED1-3F4C-4576-9568-E8EF953AA21A}" type="datetimeFigureOut">
               <a:rPr lang="en-US" smtClean="0"/>
-              <a:t>2/23/2021</a:t>
+              <a:t>4/10/2021</a:t>
             </a:fld>
             <a:endParaRPr lang="en-US"/>
           </a:p>
@@ -1254,7 +1283,7 @@
           <a:p>
             <a:fld id="{9FF62ED1-3F4C-4576-9568-E8EF953AA21A}" type="datetimeFigureOut">
               <a:rPr lang="en-US" smtClean="0"/>
-              <a:t>2/23/2021</a:t>
+              <a:t>4/10/2021</a:t>
             </a:fld>
             <a:endParaRPr lang="en-US"/>
           </a:p>
@@ -1424,7 +1453,7 @@
           <a:p>
             <a:fld id="{9FF62ED1-3F4C-4576-9568-E8EF953AA21A}" type="datetimeFigureOut">
               <a:rPr lang="en-US" smtClean="0"/>
-              <a:t>2/23/2021</a:t>
+              <a:t>4/10/2021</a:t>
             </a:fld>
             <a:endParaRPr lang="en-US"/>
           </a:p>
@@ -1670,7 +1699,7 @@
           <a:p>
             <a:fld id="{9FF62ED1-3F4C-4576-9568-E8EF953AA21A}" type="datetimeFigureOut">
               <a:rPr lang="en-US" smtClean="0"/>
-              <a:t>2/23/2021</a:t>
+              <a:t>4/10/2021</a:t>
             </a:fld>
             <a:endParaRPr lang="en-US"/>
           </a:p>
@@ -1902,7 +1931,7 @@
           <a:p>
             <a:fld id="{9FF62ED1-3F4C-4576-9568-E8EF953AA21A}" type="datetimeFigureOut">
               <a:rPr lang="en-US" smtClean="0"/>
-              <a:t>2/23/2021</a:t>
+              <a:t>4/10/2021</a:t>
             </a:fld>
             <a:endParaRPr lang="en-US"/>
           </a:p>
@@ -2269,7 +2298,7 @@
           <a:p>
             <a:fld id="{9FF62ED1-3F4C-4576-9568-E8EF953AA21A}" type="datetimeFigureOut">
               <a:rPr lang="en-US" smtClean="0"/>
-              <a:t>2/23/2021</a:t>
+              <a:t>4/10/2021</a:t>
             </a:fld>
             <a:endParaRPr lang="en-US"/>
           </a:p>
@@ -2387,7 +2416,7 @@
           <a:p>
             <a:fld id="{9FF62ED1-3F4C-4576-9568-E8EF953AA21A}" type="datetimeFigureOut">
               <a:rPr lang="en-US" smtClean="0"/>
-              <a:t>2/23/2021</a:t>
+              <a:t>4/10/2021</a:t>
             </a:fld>
             <a:endParaRPr lang="en-US"/>
           </a:p>
@@ -2482,7 +2511,7 @@
           <a:p>
             <a:fld id="{9FF62ED1-3F4C-4576-9568-E8EF953AA21A}" type="datetimeFigureOut">
               <a:rPr lang="en-US" smtClean="0"/>
-              <a:t>2/23/2021</a:t>
+              <a:t>4/10/2021</a:t>
             </a:fld>
             <a:endParaRPr lang="en-US"/>
           </a:p>
@@ -2759,7 +2788,7 @@
           <a:p>
             <a:fld id="{9FF62ED1-3F4C-4576-9568-E8EF953AA21A}" type="datetimeFigureOut">
               <a:rPr lang="en-US" smtClean="0"/>
-              <a:t>2/23/2021</a:t>
+              <a:t>4/10/2021</a:t>
             </a:fld>
             <a:endParaRPr lang="en-US"/>
           </a:p>
@@ -3016,7 +3045,7 @@
           <a:p>
             <a:fld id="{9FF62ED1-3F4C-4576-9568-E8EF953AA21A}" type="datetimeFigureOut">
               <a:rPr lang="en-US" smtClean="0"/>
-              <a:t>2/23/2021</a:t>
+              <a:t>4/10/2021</a:t>
             </a:fld>
             <a:endParaRPr lang="en-US"/>
           </a:p>
@@ -3229,7 +3258,7 @@
           <a:p>
             <a:fld id="{9FF62ED1-3F4C-4576-9568-E8EF953AA21A}" type="datetimeFigureOut">
               <a:rPr lang="en-US" smtClean="0"/>
-              <a:t>2/23/2021</a:t>
+              <a:t>4/10/2021</a:t>
             </a:fld>
             <a:endParaRPr lang="en-US"/>
           </a:p>
@@ -4179,7 +4208,7 @@
                   <a:cs typeface="Calibri"/>
                   <a:sym typeface="Calibri"/>
                 </a:rPr>
-                <a:t>3-day recovery + 1-day PEG 3350 + FMT (N = 12)</a:t>
+                <a:t>3-day recovery + 1-day PEG 3350 + FMT (N = 6)</a:t>
               </a:r>
             </a:p>
             <a:p>
@@ -4192,7 +4221,7 @@
                   <a:cs typeface="Calibri"/>
                   <a:sym typeface="Calibri"/>
                 </a:rPr>
-                <a:t>3-day recovery + 1-day PEG 3350 + PBS (N = 6)</a:t>
+                <a:t>3-day recovery + 1-day PEG 3350 + PBS (N = 12)</a:t>
               </a:r>
             </a:p>
             <a:p>

</xml_diff>

<commit_message>
Make Fig 5 edits (alpha, remove 3350, replcace hm w/ lp)
</commit_message>
<xml_diff>
--- a/results/figures/post_CDI_PEG_exp_schematic.pptx
+++ b/results/figures/post_CDI_PEG_exp_schematic.pptx
@@ -120,18 +120,18 @@
   <pc:docChgLst>
     <pc:chgData name="Ana Taylor" userId="14c7f9ef16d6513a" providerId="LiveId" clId="{67B3A858-3F00-4828-8DC2-620723065ABC}"/>
     <pc:docChg chg="modSld">
-      <pc:chgData name="Ana Taylor" userId="14c7f9ef16d6513a" providerId="LiveId" clId="{67B3A858-3F00-4828-8DC2-620723065ABC}" dt="2021-04-10T20:58:46.977" v="5" actId="20577"/>
+      <pc:chgData name="Ana Taylor" userId="14c7f9ef16d6513a" providerId="LiveId" clId="{67B3A858-3F00-4828-8DC2-620723065ABC}" dt="2021-04-15T17:44:22.945" v="24" actId="20577"/>
       <pc:docMkLst>
         <pc:docMk/>
       </pc:docMkLst>
       <pc:sldChg chg="modSp mod">
-        <pc:chgData name="Ana Taylor" userId="14c7f9ef16d6513a" providerId="LiveId" clId="{67B3A858-3F00-4828-8DC2-620723065ABC}" dt="2021-04-10T20:58:46.977" v="5" actId="20577"/>
+        <pc:chgData name="Ana Taylor" userId="14c7f9ef16d6513a" providerId="LiveId" clId="{67B3A858-3F00-4828-8DC2-620723065ABC}" dt="2021-04-15T17:44:22.945" v="24" actId="20577"/>
         <pc:sldMkLst>
           <pc:docMk/>
           <pc:sldMk cId="3159908065" sldId="533"/>
         </pc:sldMkLst>
         <pc:spChg chg="mod">
-          <ac:chgData name="Ana Taylor" userId="14c7f9ef16d6513a" providerId="LiveId" clId="{67B3A858-3F00-4828-8DC2-620723065ABC}" dt="2021-04-10T20:58:46.977" v="5" actId="20577"/>
+          <ac:chgData name="Ana Taylor" userId="14c7f9ef16d6513a" providerId="LiveId" clId="{67B3A858-3F00-4828-8DC2-620723065ABC}" dt="2021-04-15T17:44:22.945" v="24" actId="20577"/>
           <ac:spMkLst>
             <pc:docMk/>
             <pc:sldMk cId="3159908065" sldId="533"/>
@@ -226,7 +226,7 @@
           <a:p>
             <a:fld id="{A2B1C1CA-69EF-464D-AE40-C4D6E113BFD1}" type="datetimeFigureOut">
               <a:rPr lang="en-US" smtClean="0"/>
-              <a:t>4/10/2021</a:t>
+              <a:t>4/15/2021</a:t>
             </a:fld>
             <a:endParaRPr lang="en-US"/>
           </a:p>
@@ -933,7 +933,7 @@
           <a:p>
             <a:fld id="{9FF62ED1-3F4C-4576-9568-E8EF953AA21A}" type="datetimeFigureOut">
               <a:rPr lang="en-US" smtClean="0"/>
-              <a:t>4/10/2021</a:t>
+              <a:t>4/15/2021</a:t>
             </a:fld>
             <a:endParaRPr lang="en-US"/>
           </a:p>
@@ -1103,7 +1103,7 @@
           <a:p>
             <a:fld id="{9FF62ED1-3F4C-4576-9568-E8EF953AA21A}" type="datetimeFigureOut">
               <a:rPr lang="en-US" smtClean="0"/>
-              <a:t>4/10/2021</a:t>
+              <a:t>4/15/2021</a:t>
             </a:fld>
             <a:endParaRPr lang="en-US"/>
           </a:p>
@@ -1283,7 +1283,7 @@
           <a:p>
             <a:fld id="{9FF62ED1-3F4C-4576-9568-E8EF953AA21A}" type="datetimeFigureOut">
               <a:rPr lang="en-US" smtClean="0"/>
-              <a:t>4/10/2021</a:t>
+              <a:t>4/15/2021</a:t>
             </a:fld>
             <a:endParaRPr lang="en-US"/>
           </a:p>
@@ -1453,7 +1453,7 @@
           <a:p>
             <a:fld id="{9FF62ED1-3F4C-4576-9568-E8EF953AA21A}" type="datetimeFigureOut">
               <a:rPr lang="en-US" smtClean="0"/>
-              <a:t>4/10/2021</a:t>
+              <a:t>4/15/2021</a:t>
             </a:fld>
             <a:endParaRPr lang="en-US"/>
           </a:p>
@@ -1699,7 +1699,7 @@
           <a:p>
             <a:fld id="{9FF62ED1-3F4C-4576-9568-E8EF953AA21A}" type="datetimeFigureOut">
               <a:rPr lang="en-US" smtClean="0"/>
-              <a:t>4/10/2021</a:t>
+              <a:t>4/15/2021</a:t>
             </a:fld>
             <a:endParaRPr lang="en-US"/>
           </a:p>
@@ -1931,7 +1931,7 @@
           <a:p>
             <a:fld id="{9FF62ED1-3F4C-4576-9568-E8EF953AA21A}" type="datetimeFigureOut">
               <a:rPr lang="en-US" smtClean="0"/>
-              <a:t>4/10/2021</a:t>
+              <a:t>4/15/2021</a:t>
             </a:fld>
             <a:endParaRPr lang="en-US"/>
           </a:p>
@@ -2298,7 +2298,7 @@
           <a:p>
             <a:fld id="{9FF62ED1-3F4C-4576-9568-E8EF953AA21A}" type="datetimeFigureOut">
               <a:rPr lang="en-US" smtClean="0"/>
-              <a:t>4/10/2021</a:t>
+              <a:t>4/15/2021</a:t>
             </a:fld>
             <a:endParaRPr lang="en-US"/>
           </a:p>
@@ -2416,7 +2416,7 @@
           <a:p>
             <a:fld id="{9FF62ED1-3F4C-4576-9568-E8EF953AA21A}" type="datetimeFigureOut">
               <a:rPr lang="en-US" smtClean="0"/>
-              <a:t>4/10/2021</a:t>
+              <a:t>4/15/2021</a:t>
             </a:fld>
             <a:endParaRPr lang="en-US"/>
           </a:p>
@@ -2511,7 +2511,7 @@
           <a:p>
             <a:fld id="{9FF62ED1-3F4C-4576-9568-E8EF953AA21A}" type="datetimeFigureOut">
               <a:rPr lang="en-US" smtClean="0"/>
-              <a:t>4/10/2021</a:t>
+              <a:t>4/15/2021</a:t>
             </a:fld>
             <a:endParaRPr lang="en-US"/>
           </a:p>
@@ -2788,7 +2788,7 @@
           <a:p>
             <a:fld id="{9FF62ED1-3F4C-4576-9568-E8EF953AA21A}" type="datetimeFigureOut">
               <a:rPr lang="en-US" smtClean="0"/>
-              <a:t>4/10/2021</a:t>
+              <a:t>4/15/2021</a:t>
             </a:fld>
             <a:endParaRPr lang="en-US"/>
           </a:p>
@@ -3045,7 +3045,7 @@
           <a:p>
             <a:fld id="{9FF62ED1-3F4C-4576-9568-E8EF953AA21A}" type="datetimeFigureOut">
               <a:rPr lang="en-US" smtClean="0"/>
-              <a:t>4/10/2021</a:t>
+              <a:t>4/15/2021</a:t>
             </a:fld>
             <a:endParaRPr lang="en-US"/>
           </a:p>
@@ -3258,7 +3258,7 @@
           <a:p>
             <a:fld id="{9FF62ED1-3F4C-4576-9568-E8EF953AA21A}" type="datetimeFigureOut">
               <a:rPr lang="en-US" smtClean="0"/>
-              <a:t>4/10/2021</a:t>
+              <a:t>4/15/2021</a:t>
             </a:fld>
             <a:endParaRPr lang="en-US"/>
           </a:p>
@@ -4184,7 +4184,7 @@
                   <a:cs typeface="Calibri"/>
                   <a:sym typeface="Calibri"/>
                 </a:rPr>
-                <a:t>1-day of 15% PEG 3350 in drinking water (N = 18)</a:t>
+                <a:t>1-day of 15% PEG in drinking water (N = 18)</a:t>
               </a:r>
               <a:r>
                 <a:rPr lang="en-US" sz="1428" dirty="0">
@@ -4208,7 +4208,7 @@
                   <a:cs typeface="Calibri"/>
                   <a:sym typeface="Calibri"/>
                 </a:rPr>
-                <a:t>3-day recovery + 1-day PEG 3350 + FMT (N = 6)</a:t>
+                <a:t>3-day recovery + 1-day PEG + FMT (N = 6)</a:t>
               </a:r>
             </a:p>
             <a:p>
@@ -4221,7 +4221,7 @@
                   <a:cs typeface="Calibri"/>
                   <a:sym typeface="Calibri"/>
                 </a:rPr>
-                <a:t>3-day recovery + 1-day PEG 3350 + PBS (N = 12)</a:t>
+                <a:t>3-day recovery + 1-day PEG + PBS (N = 12)</a:t>
               </a:r>
             </a:p>
             <a:p>

</xml_diff>

<commit_message>
Update post cdi peg schematic grp labels
</commit_message>
<xml_diff>
--- a/results/figures/post_CDI_PEG_exp_schematic.pptx
+++ b/results/figures/post_CDI_PEG_exp_schematic.pptx
@@ -120,18 +120,18 @@
   <pc:docChgLst>
     <pc:chgData name="Ana Taylor" userId="14c7f9ef16d6513a" providerId="LiveId" clId="{67B3A858-3F00-4828-8DC2-620723065ABC}"/>
     <pc:docChg chg="modSld">
-      <pc:chgData name="Ana Taylor" userId="14c7f9ef16d6513a" providerId="LiveId" clId="{67B3A858-3F00-4828-8DC2-620723065ABC}" dt="2021-04-15T17:44:22.945" v="24" actId="20577"/>
+      <pc:chgData name="Ana Taylor" userId="14c7f9ef16d6513a" providerId="LiveId" clId="{67B3A858-3F00-4828-8DC2-620723065ABC}" dt="2021-04-21T18:49:30.370" v="53" actId="6549"/>
       <pc:docMkLst>
         <pc:docMk/>
       </pc:docMkLst>
       <pc:sldChg chg="modSp mod">
-        <pc:chgData name="Ana Taylor" userId="14c7f9ef16d6513a" providerId="LiveId" clId="{67B3A858-3F00-4828-8DC2-620723065ABC}" dt="2021-04-15T17:44:22.945" v="24" actId="20577"/>
+        <pc:chgData name="Ana Taylor" userId="14c7f9ef16d6513a" providerId="LiveId" clId="{67B3A858-3F00-4828-8DC2-620723065ABC}" dt="2021-04-21T18:49:30.370" v="53" actId="6549"/>
         <pc:sldMkLst>
           <pc:docMk/>
           <pc:sldMk cId="3159908065" sldId="533"/>
         </pc:sldMkLst>
         <pc:spChg chg="mod">
-          <ac:chgData name="Ana Taylor" userId="14c7f9ef16d6513a" providerId="LiveId" clId="{67B3A858-3F00-4828-8DC2-620723065ABC}" dt="2021-04-15T17:44:22.945" v="24" actId="20577"/>
+          <ac:chgData name="Ana Taylor" userId="14c7f9ef16d6513a" providerId="LiveId" clId="{67B3A858-3F00-4828-8DC2-620723065ABC}" dt="2021-04-21T18:49:30.370" v="53" actId="6549"/>
           <ac:spMkLst>
             <pc:docMk/>
             <pc:sldMk cId="3159908065" sldId="533"/>
@@ -226,7 +226,7 @@
           <a:p>
             <a:fld id="{A2B1C1CA-69EF-464D-AE40-C4D6E113BFD1}" type="datetimeFigureOut">
               <a:rPr lang="en-US" smtClean="0"/>
-              <a:t>4/15/2021</a:t>
+              <a:t>4/21/2021</a:t>
             </a:fld>
             <a:endParaRPr lang="en-US"/>
           </a:p>
@@ -933,7 +933,7 @@
           <a:p>
             <a:fld id="{9FF62ED1-3F4C-4576-9568-E8EF953AA21A}" type="datetimeFigureOut">
               <a:rPr lang="en-US" smtClean="0"/>
-              <a:t>4/15/2021</a:t>
+              <a:t>4/21/2021</a:t>
             </a:fld>
             <a:endParaRPr lang="en-US"/>
           </a:p>
@@ -1103,7 +1103,7 @@
           <a:p>
             <a:fld id="{9FF62ED1-3F4C-4576-9568-E8EF953AA21A}" type="datetimeFigureOut">
               <a:rPr lang="en-US" smtClean="0"/>
-              <a:t>4/15/2021</a:t>
+              <a:t>4/21/2021</a:t>
             </a:fld>
             <a:endParaRPr lang="en-US"/>
           </a:p>
@@ -1283,7 +1283,7 @@
           <a:p>
             <a:fld id="{9FF62ED1-3F4C-4576-9568-E8EF953AA21A}" type="datetimeFigureOut">
               <a:rPr lang="en-US" smtClean="0"/>
-              <a:t>4/15/2021</a:t>
+              <a:t>4/21/2021</a:t>
             </a:fld>
             <a:endParaRPr lang="en-US"/>
           </a:p>
@@ -1453,7 +1453,7 @@
           <a:p>
             <a:fld id="{9FF62ED1-3F4C-4576-9568-E8EF953AA21A}" type="datetimeFigureOut">
               <a:rPr lang="en-US" smtClean="0"/>
-              <a:t>4/15/2021</a:t>
+              <a:t>4/21/2021</a:t>
             </a:fld>
             <a:endParaRPr lang="en-US"/>
           </a:p>
@@ -1699,7 +1699,7 @@
           <a:p>
             <a:fld id="{9FF62ED1-3F4C-4576-9568-E8EF953AA21A}" type="datetimeFigureOut">
               <a:rPr lang="en-US" smtClean="0"/>
-              <a:t>4/15/2021</a:t>
+              <a:t>4/21/2021</a:t>
             </a:fld>
             <a:endParaRPr lang="en-US"/>
           </a:p>
@@ -1931,7 +1931,7 @@
           <a:p>
             <a:fld id="{9FF62ED1-3F4C-4576-9568-E8EF953AA21A}" type="datetimeFigureOut">
               <a:rPr lang="en-US" smtClean="0"/>
-              <a:t>4/15/2021</a:t>
+              <a:t>4/21/2021</a:t>
             </a:fld>
             <a:endParaRPr lang="en-US"/>
           </a:p>
@@ -2298,7 +2298,7 @@
           <a:p>
             <a:fld id="{9FF62ED1-3F4C-4576-9568-E8EF953AA21A}" type="datetimeFigureOut">
               <a:rPr lang="en-US" smtClean="0"/>
-              <a:t>4/15/2021</a:t>
+              <a:t>4/21/2021</a:t>
             </a:fld>
             <a:endParaRPr lang="en-US"/>
           </a:p>
@@ -2416,7 +2416,7 @@
           <a:p>
             <a:fld id="{9FF62ED1-3F4C-4576-9568-E8EF953AA21A}" type="datetimeFigureOut">
               <a:rPr lang="en-US" smtClean="0"/>
-              <a:t>4/15/2021</a:t>
+              <a:t>4/21/2021</a:t>
             </a:fld>
             <a:endParaRPr lang="en-US"/>
           </a:p>
@@ -2511,7 +2511,7 @@
           <a:p>
             <a:fld id="{9FF62ED1-3F4C-4576-9568-E8EF953AA21A}" type="datetimeFigureOut">
               <a:rPr lang="en-US" smtClean="0"/>
-              <a:t>4/15/2021</a:t>
+              <a:t>4/21/2021</a:t>
             </a:fld>
             <a:endParaRPr lang="en-US"/>
           </a:p>
@@ -2788,7 +2788,7 @@
           <a:p>
             <a:fld id="{9FF62ED1-3F4C-4576-9568-E8EF953AA21A}" type="datetimeFigureOut">
               <a:rPr lang="en-US" smtClean="0"/>
-              <a:t>4/15/2021</a:t>
+              <a:t>4/21/2021</a:t>
             </a:fld>
             <a:endParaRPr lang="en-US"/>
           </a:p>
@@ -3045,7 +3045,7 @@
           <a:p>
             <a:fld id="{9FF62ED1-3F4C-4576-9568-E8EF953AA21A}" type="datetimeFigureOut">
               <a:rPr lang="en-US" smtClean="0"/>
-              <a:t>4/15/2021</a:t>
+              <a:t>4/21/2021</a:t>
             </a:fld>
             <a:endParaRPr lang="en-US"/>
           </a:p>
@@ -3258,7 +3258,7 @@
           <a:p>
             <a:fld id="{9FF62ED1-3F4C-4576-9568-E8EF953AA21A}" type="datetimeFigureOut">
               <a:rPr lang="en-US" smtClean="0"/>
-              <a:t>4/15/2021</a:t>
+              <a:t>4/21/2021</a:t>
             </a:fld>
             <a:endParaRPr lang="en-US"/>
           </a:p>
@@ -4171,10 +4171,21 @@
                   <a:cs typeface="Calibri"/>
                   <a:sym typeface="Calibri"/>
                 </a:rPr>
-                <a:t>Clindamycin: 10mg/kg (N = 12)</a:t>
+                <a:t>Clindamycin (N=12)</a:t>
               </a:r>
             </a:p>
             <a:p>
+              <a:r>
+                <a:rPr lang="en-US" sz="1428" dirty="0" err="1">
+                  <a:solidFill>
+                    <a:srgbClr val="88419D"/>
+                  </a:solidFill>
+                  <a:ea typeface="Calibri"/>
+                  <a:cs typeface="Calibri"/>
+                  <a:sym typeface="Calibri"/>
+                </a:rPr>
+                <a:t>Clind</a:t>
+              </a:r>
               <a:r>
                 <a:rPr lang="en-US" sz="1428" dirty="0">
                   <a:solidFill>
@@ -4184,7 +4195,7 @@
                   <a:cs typeface="Calibri"/>
                   <a:sym typeface="Calibri"/>
                 </a:rPr>
-                <a:t>1-day of 15% PEG in drinking water (N = 18)</a:t>
+                <a:t>. + 1-day PEG (N=18)</a:t>
               </a:r>
               <a:r>
                 <a:rPr lang="en-US" sz="1428" dirty="0">
@@ -4200,6 +4211,17 @@
             </a:p>
             <a:p>
               <a:r>
+                <a:rPr lang="en-US" sz="1428" dirty="0" err="1">
+                  <a:solidFill>
+                    <a:srgbClr val="F768A1"/>
+                  </a:solidFill>
+                  <a:ea typeface="Calibri"/>
+                  <a:cs typeface="Calibri"/>
+                  <a:sym typeface="Calibri"/>
+                </a:rPr>
+                <a:t>Clind</a:t>
+              </a:r>
+              <a:r>
                 <a:rPr lang="en-US" sz="1428" dirty="0">
                   <a:solidFill>
                     <a:srgbClr val="F768A1"/>
@@ -4208,10 +4230,21 @@
                   <a:cs typeface="Calibri"/>
                   <a:sym typeface="Calibri"/>
                 </a:rPr>
-                <a:t>3-day recovery + 1-day PEG + FMT (N = 6)</a:t>
+                <a:t>. + 3-day recovery  + 1-day PEG + FMT (N=6)</a:t>
               </a:r>
             </a:p>
             <a:p>
+              <a:r>
+                <a:rPr lang="en-US" sz="1428" dirty="0" err="1">
+                  <a:solidFill>
+                    <a:srgbClr val="225EA8"/>
+                  </a:solidFill>
+                  <a:ea typeface="Calibri"/>
+                  <a:cs typeface="Calibri"/>
+                  <a:sym typeface="Calibri"/>
+                </a:rPr>
+                <a:t>Clind</a:t>
+              </a:r>
               <a:r>
                 <a:rPr lang="en-US" sz="1428" dirty="0">
                   <a:solidFill>
@@ -4221,7 +4254,7 @@
                   <a:cs typeface="Calibri"/>
                   <a:sym typeface="Calibri"/>
                 </a:rPr>
-                <a:t>3-day recovery + 1-day PEG + PBS (N = 12)</a:t>
+                <a:t>. + 3-day recovery + 1-day PEG + PBS (N=12)</a:t>
               </a:r>
             </a:p>
             <a:p>

</xml_diff>